<commit_message>
finish up with normalization
</commit_message>
<xml_diff>
--- a/classes/ChapelHill2018/ch.pptx
+++ b/classes/ChapelHill2018/ch.pptx
@@ -5,17 +5,32 @@
     <p:sldMasterId id="2147483648" r:id="rId1"/>
   </p:sldMasterIdLst>
   <p:notesMasterIdLst>
-    <p:notesMasterId r:id="rId10"/>
+    <p:notesMasterId r:id="rId25"/>
   </p:notesMasterIdLst>
   <p:sldIdLst>
     <p:sldId id="256" r:id="rId2"/>
-    <p:sldId id="258" r:id="rId3"/>
-    <p:sldId id="259" r:id="rId4"/>
-    <p:sldId id="260" r:id="rId5"/>
-    <p:sldId id="261" r:id="rId6"/>
-    <p:sldId id="257" r:id="rId7"/>
-    <p:sldId id="262" r:id="rId8"/>
-    <p:sldId id="263" r:id="rId9"/>
+    <p:sldId id="264" r:id="rId3"/>
+    <p:sldId id="266" r:id="rId4"/>
+    <p:sldId id="258" r:id="rId5"/>
+    <p:sldId id="259" r:id="rId6"/>
+    <p:sldId id="260" r:id="rId7"/>
+    <p:sldId id="261" r:id="rId8"/>
+    <p:sldId id="257" r:id="rId9"/>
+    <p:sldId id="267" r:id="rId10"/>
+    <p:sldId id="262" r:id="rId11"/>
+    <p:sldId id="263" r:id="rId12"/>
+    <p:sldId id="265" r:id="rId13"/>
+    <p:sldId id="268" r:id="rId14"/>
+    <p:sldId id="269" r:id="rId15"/>
+    <p:sldId id="270" r:id="rId16"/>
+    <p:sldId id="271" r:id="rId17"/>
+    <p:sldId id="272" r:id="rId18"/>
+    <p:sldId id="273" r:id="rId19"/>
+    <p:sldId id="274" r:id="rId20"/>
+    <p:sldId id="275" r:id="rId21"/>
+    <p:sldId id="276" r:id="rId22"/>
+    <p:sldId id="277" r:id="rId23"/>
+    <p:sldId id="278" r:id="rId24"/>
   </p:sldIdLst>
   <p:sldSz cx="12192000" cy="6858000"/>
   <p:notesSz cx="6858000" cy="9144000"/>
@@ -537,7 +552,7 @@
           <a:p>
             <a:fld id="{6121FA07-61D2-4525-8ECC-C959FF2CBAEE}" type="slidenum">
               <a:rPr lang="en-US" smtClean="0"/>
-              <a:t>4</a:t>
+              <a:t>6</a:t>
             </a:fld>
             <a:endParaRPr lang="en-US"/>
           </a:p>
@@ -3549,6 +3564,1531 @@
 </p:sld>
 </file>
 
+<file path=ppt/slides/slide10.xml><?xml version="1.0" encoding="utf-8"?>
+<p:sld xmlns:a="http://schemas.openxmlformats.org/drawingml/2006/main" xmlns:r="http://schemas.openxmlformats.org/officeDocument/2006/relationships" xmlns:p="http://schemas.openxmlformats.org/presentationml/2006/main">
+  <p:cSld>
+    <p:spTree>
+      <p:nvGrpSpPr>
+        <p:cNvPr id="1" name=""/>
+        <p:cNvGrpSpPr/>
+        <p:nvPr/>
+      </p:nvGrpSpPr>
+      <p:grpSpPr>
+        <a:xfrm>
+          <a:off x="0" y="0"/>
+          <a:ext cx="0" cy="0"/>
+          <a:chOff x="0" y="0"/>
+          <a:chExt cx="0" cy="0"/>
+        </a:xfrm>
+      </p:grpSpPr>
+      <p:sp>
+        <p:nvSpPr>
+          <p:cNvPr id="4" name="TextBox 3"/>
+          <p:cNvSpPr txBox="1"/>
+          <p:nvPr/>
+        </p:nvSpPr>
+        <p:spPr>
+          <a:xfrm>
+            <a:off x="68894" y="12527"/>
+            <a:ext cx="8195513" cy="923330"/>
+          </a:xfrm>
+          <a:prstGeom prst="rect">
+            <a:avLst/>
+          </a:prstGeom>
+          <a:noFill/>
+        </p:spPr>
+        <p:txBody>
+          <a:bodyPr wrap="none" rtlCol="0">
+            <a:spAutoFit/>
+          </a:bodyPr>
+          <a:lstStyle/>
+          <a:p>
+            <a:r>
+              <a:rPr lang="en-US" dirty="0" smtClean="0">
+                <a:latin typeface="Arial" panose="020B0604020202020204" pitchFamily="34" charset="0"/>
+                <a:cs typeface="Arial" panose="020B0604020202020204" pitchFamily="34" charset="0"/>
+              </a:rPr>
+              <a:t>You will need to choose some normalization scheme..</a:t>
+            </a:r>
+          </a:p>
+          <a:p>
+            <a:endParaRPr lang="en-US" dirty="0">
+              <a:latin typeface="Arial" panose="020B0604020202020204" pitchFamily="34" charset="0"/>
+              <a:cs typeface="Arial" panose="020B0604020202020204" pitchFamily="34" charset="0"/>
+            </a:endParaRPr>
+          </a:p>
+          <a:p>
+            <a:r>
+              <a:rPr lang="en-US" dirty="0" smtClean="0">
+                <a:latin typeface="Arial" panose="020B0604020202020204" pitchFamily="34" charset="0"/>
+                <a:cs typeface="Arial" panose="020B0604020202020204" pitchFamily="34" charset="0"/>
+              </a:rPr>
+              <a:t>(Each sequence library will be of a different depth; you need to correct for that)</a:t>
+            </a:r>
+            <a:endParaRPr lang="en-US" dirty="0">
+              <a:latin typeface="Arial" panose="020B0604020202020204" pitchFamily="34" charset="0"/>
+              <a:cs typeface="Arial" panose="020B0604020202020204" pitchFamily="34" charset="0"/>
+            </a:endParaRPr>
+          </a:p>
+        </p:txBody>
+      </p:sp>
+      <p:pic>
+        <p:nvPicPr>
+          <p:cNvPr id="6" name="Picture 5"/>
+          <p:cNvPicPr>
+            <a:picLocks noChangeAspect="1"/>
+          </p:cNvPicPr>
+          <p:nvPr/>
+        </p:nvPicPr>
+        <p:blipFill>
+          <a:blip r:embed="rId2"/>
+          <a:stretch>
+            <a:fillRect/>
+          </a:stretch>
+        </p:blipFill>
+        <p:spPr>
+          <a:xfrm>
+            <a:off x="2830424" y="935857"/>
+            <a:ext cx="5934672" cy="4572000"/>
+          </a:xfrm>
+          <a:prstGeom prst="rect">
+            <a:avLst/>
+          </a:prstGeom>
+        </p:spPr>
+      </p:pic>
+      <p:sp>
+        <p:nvSpPr>
+          <p:cNvPr id="7" name="TextBox 6"/>
+          <p:cNvSpPr txBox="1"/>
+          <p:nvPr/>
+        </p:nvSpPr>
+        <p:spPr>
+          <a:xfrm>
+            <a:off x="338203" y="5549031"/>
+            <a:ext cx="11559575" cy="646331"/>
+          </a:xfrm>
+          <a:prstGeom prst="rect">
+            <a:avLst/>
+          </a:prstGeom>
+          <a:noFill/>
+        </p:spPr>
+        <p:txBody>
+          <a:bodyPr wrap="none" rtlCol="0">
+            <a:spAutoFit/>
+          </a:bodyPr>
+          <a:lstStyle/>
+          <a:p>
+            <a:r>
+              <a:rPr lang="en-US" dirty="0" smtClean="0">
+                <a:latin typeface="Arial" panose="020B0604020202020204" pitchFamily="34" charset="0"/>
+                <a:cs typeface="Arial" panose="020B0604020202020204" pitchFamily="34" charset="0"/>
+              </a:rPr>
+              <a:t>The easiest (not necessarily the best) approach is to divide each cell by the total # of sequences in that sample.</a:t>
+            </a:r>
+          </a:p>
+          <a:p>
+            <a:r>
+              <a:rPr lang="en-US" dirty="0" smtClean="0">
+                <a:latin typeface="Arial" panose="020B0604020202020204" pitchFamily="34" charset="0"/>
+                <a:cs typeface="Arial" panose="020B0604020202020204" pitchFamily="34" charset="0"/>
+              </a:rPr>
+              <a:t>This is relative abundance</a:t>
+            </a:r>
+            <a:endParaRPr lang="en-US" dirty="0">
+              <a:latin typeface="Arial" panose="020B0604020202020204" pitchFamily="34" charset="0"/>
+              <a:cs typeface="Arial" panose="020B0604020202020204" pitchFamily="34" charset="0"/>
+            </a:endParaRPr>
+          </a:p>
+        </p:txBody>
+      </p:sp>
+      <p:sp>
+        <p:nvSpPr>
+          <p:cNvPr id="8" name="TextBox 7"/>
+          <p:cNvSpPr txBox="1"/>
+          <p:nvPr/>
+        </p:nvSpPr>
+        <p:spPr>
+          <a:xfrm>
+            <a:off x="6469687" y="6538586"/>
+            <a:ext cx="5749651" cy="369332"/>
+          </a:xfrm>
+          <a:prstGeom prst="rect">
+            <a:avLst/>
+          </a:prstGeom>
+          <a:noFill/>
+        </p:spPr>
+        <p:txBody>
+          <a:bodyPr wrap="none" rtlCol="0">
+            <a:spAutoFit/>
+          </a:bodyPr>
+          <a:lstStyle/>
+          <a:p>
+            <a:r>
+              <a:rPr lang="en-US" dirty="0" smtClean="0"/>
+              <a:t>Table due to :Matthew </a:t>
+            </a:r>
+            <a:r>
+              <a:rPr lang="en-US" dirty="0"/>
+              <a:t>C. B. </a:t>
+            </a:r>
+            <a:r>
+              <a:rPr lang="en-US" dirty="0" err="1"/>
+              <a:t>Tsilimigras</a:t>
+            </a:r>
+            <a:r>
+              <a:rPr lang="en-US" dirty="0"/>
+              <a:t> (Matthew C. Brown)</a:t>
+            </a:r>
+          </a:p>
+        </p:txBody>
+      </p:sp>
+    </p:spTree>
+    <p:extLst>
+      <p:ext uri="{BB962C8B-B14F-4D97-AF65-F5344CB8AC3E}">
+        <p14:creationId xmlns:p14="http://schemas.microsoft.com/office/powerpoint/2010/main" val="3437254749"/>
+      </p:ext>
+    </p:extLst>
+  </p:cSld>
+  <p:clrMapOvr>
+    <a:masterClrMapping/>
+  </p:clrMapOvr>
+  <p:timing>
+    <p:tnLst>
+      <p:par>
+        <p:cTn id="1" dur="indefinite" restart="never" nodeType="tmRoot"/>
+      </p:par>
+    </p:tnLst>
+  </p:timing>
+</p:sld>
+</file>
+
+<file path=ppt/slides/slide11.xml><?xml version="1.0" encoding="utf-8"?>
+<p:sld xmlns:a="http://schemas.openxmlformats.org/drawingml/2006/main" xmlns:r="http://schemas.openxmlformats.org/officeDocument/2006/relationships" xmlns:p="http://schemas.openxmlformats.org/presentationml/2006/main">
+  <p:cSld>
+    <p:spTree>
+      <p:nvGrpSpPr>
+        <p:cNvPr id="1" name=""/>
+        <p:cNvGrpSpPr/>
+        <p:nvPr/>
+      </p:nvGrpSpPr>
+      <p:grpSpPr>
+        <a:xfrm>
+          <a:off x="0" y="0"/>
+          <a:ext cx="0" cy="0"/>
+          <a:chOff x="0" y="0"/>
+          <a:chExt cx="0" cy="0"/>
+        </a:xfrm>
+      </p:grpSpPr>
+      <p:sp>
+        <p:nvSpPr>
+          <p:cNvPr id="4" name="TextBox 3"/>
+          <p:cNvSpPr txBox="1"/>
+          <p:nvPr/>
+        </p:nvSpPr>
+        <p:spPr>
+          <a:xfrm>
+            <a:off x="95740" y="134873"/>
+            <a:ext cx="11157863" cy="1754326"/>
+          </a:xfrm>
+          <a:prstGeom prst="rect">
+            <a:avLst/>
+          </a:prstGeom>
+          <a:noFill/>
+        </p:spPr>
+        <p:txBody>
+          <a:bodyPr wrap="none" rtlCol="0">
+            <a:spAutoFit/>
+          </a:bodyPr>
+          <a:lstStyle/>
+          <a:p>
+            <a:r>
+              <a:rPr lang="en-US" dirty="0" smtClean="0">
+                <a:latin typeface="Arial" panose="020B0604020202020204" pitchFamily="34" charset="0"/>
+                <a:cs typeface="Arial" panose="020B0604020202020204" pitchFamily="34" charset="0"/>
+              </a:rPr>
+              <a:t>Let’s say you have a spreadsheet that is un-normalized and you want to change it to log relative abundance</a:t>
+            </a:r>
+          </a:p>
+          <a:p>
+            <a:endParaRPr lang="en-US" dirty="0">
+              <a:latin typeface="Arial" panose="020B0604020202020204" pitchFamily="34" charset="0"/>
+              <a:cs typeface="Arial" panose="020B0604020202020204" pitchFamily="34" charset="0"/>
+            </a:endParaRPr>
+          </a:p>
+          <a:p>
+            <a:r>
+              <a:rPr lang="en-US" dirty="0" smtClean="0">
+                <a:latin typeface="Arial" panose="020B0604020202020204" pitchFamily="34" charset="0"/>
+                <a:cs typeface="Arial" panose="020B0604020202020204" pitchFamily="34" charset="0"/>
+              </a:rPr>
+              <a:t> </a:t>
+            </a:r>
+          </a:p>
+          <a:p>
+            <a:endParaRPr lang="en-US" dirty="0">
+              <a:latin typeface="Arial" panose="020B0604020202020204" pitchFamily="34" charset="0"/>
+              <a:cs typeface="Arial" panose="020B0604020202020204" pitchFamily="34" charset="0"/>
+            </a:endParaRPr>
+          </a:p>
+          <a:p>
+            <a:endParaRPr lang="en-US" dirty="0" smtClean="0">
+              <a:latin typeface="Arial" panose="020B0604020202020204" pitchFamily="34" charset="0"/>
+              <a:cs typeface="Arial" panose="020B0604020202020204" pitchFamily="34" charset="0"/>
+            </a:endParaRPr>
+          </a:p>
+          <a:p>
+            <a:endParaRPr lang="en-US" dirty="0">
+              <a:latin typeface="Arial" panose="020B0604020202020204" pitchFamily="34" charset="0"/>
+              <a:cs typeface="Arial" panose="020B0604020202020204" pitchFamily="34" charset="0"/>
+            </a:endParaRPr>
+          </a:p>
+        </p:txBody>
+      </p:sp>
+      <p:pic>
+        <p:nvPicPr>
+          <p:cNvPr id="2" name="Picture 1"/>
+          <p:cNvPicPr>
+            <a:picLocks noChangeAspect="1"/>
+          </p:cNvPicPr>
+          <p:nvPr/>
+        </p:nvPicPr>
+        <p:blipFill>
+          <a:blip r:embed="rId2"/>
+          <a:stretch>
+            <a:fillRect/>
+          </a:stretch>
+        </p:blipFill>
+        <p:spPr>
+          <a:xfrm>
+            <a:off x="260392" y="734670"/>
+            <a:ext cx="11637847" cy="4294530"/>
+          </a:xfrm>
+          <a:prstGeom prst="rect">
+            <a:avLst/>
+          </a:prstGeom>
+        </p:spPr>
+      </p:pic>
+      <p:sp>
+        <p:nvSpPr>
+          <p:cNvPr id="3" name="Rectangle 2"/>
+          <p:cNvSpPr/>
+          <p:nvPr/>
+        </p:nvSpPr>
+        <p:spPr>
+          <a:xfrm>
+            <a:off x="1716910" y="5362898"/>
+            <a:ext cx="11350907" cy="369332"/>
+          </a:xfrm>
+          <a:prstGeom prst="rect">
+            <a:avLst/>
+          </a:prstGeom>
+        </p:spPr>
+        <p:txBody>
+          <a:bodyPr wrap="square">
+            <a:spAutoFit/>
+          </a:bodyPr>
+          <a:lstStyle/>
+          <a:p>
+            <a:r>
+              <a:rPr lang="en-US" dirty="0"/>
+              <a:t>https://github.com/kwinglee/UrbanRuralChina/blob/master/16SrRNA/inputData/RDP/genus_taxaAsColumns.txt</a:t>
+            </a:r>
+          </a:p>
+        </p:txBody>
+      </p:sp>
+    </p:spTree>
+    <p:extLst>
+      <p:ext uri="{BB962C8B-B14F-4D97-AF65-F5344CB8AC3E}">
+        <p14:creationId xmlns:p14="http://schemas.microsoft.com/office/powerpoint/2010/main" val="2817519161"/>
+      </p:ext>
+    </p:extLst>
+  </p:cSld>
+  <p:clrMapOvr>
+    <a:masterClrMapping/>
+  </p:clrMapOvr>
+  <p:timing>
+    <p:tnLst>
+      <p:par>
+        <p:cTn id="1" dur="indefinite" restart="never" nodeType="tmRoot"/>
+      </p:par>
+    </p:tnLst>
+  </p:timing>
+</p:sld>
+</file>
+
+<file path=ppt/slides/slide12.xml><?xml version="1.0" encoding="utf-8"?>
+<p:sld xmlns:a="http://schemas.openxmlformats.org/drawingml/2006/main" xmlns:r="http://schemas.openxmlformats.org/officeDocument/2006/relationships" xmlns:p="http://schemas.openxmlformats.org/presentationml/2006/main">
+  <p:cSld>
+    <p:spTree>
+      <p:nvGrpSpPr>
+        <p:cNvPr id="1" name=""/>
+        <p:cNvGrpSpPr/>
+        <p:nvPr/>
+      </p:nvGrpSpPr>
+      <p:grpSpPr>
+        <a:xfrm>
+          <a:off x="0" y="0"/>
+          <a:ext cx="0" cy="0"/>
+          <a:chOff x="0" y="0"/>
+          <a:chExt cx="0" cy="0"/>
+        </a:xfrm>
+      </p:grpSpPr>
+      <p:sp>
+        <p:nvSpPr>
+          <p:cNvPr id="4" name="TextBox 3"/>
+          <p:cNvSpPr txBox="1"/>
+          <p:nvPr/>
+        </p:nvSpPr>
+        <p:spPr>
+          <a:xfrm>
+            <a:off x="150472" y="144687"/>
+            <a:ext cx="10892726" cy="369332"/>
+          </a:xfrm>
+          <a:prstGeom prst="rect">
+            <a:avLst/>
+          </a:prstGeom>
+          <a:noFill/>
+        </p:spPr>
+        <p:txBody>
+          <a:bodyPr wrap="none" rtlCol="0">
+            <a:spAutoFit/>
+          </a:bodyPr>
+          <a:lstStyle/>
+          <a:p>
+            <a:r>
+              <a:rPr lang="en-US" dirty="0" smtClean="0">
+                <a:latin typeface="Arial" panose="020B0604020202020204" pitchFamily="34" charset="0"/>
+                <a:cs typeface="Arial" panose="020B0604020202020204" pitchFamily="34" charset="0"/>
+              </a:rPr>
+              <a:t>Here is a (complete) R script to convert a counts table to relative abundance and write the results to a file</a:t>
+            </a:r>
+            <a:endParaRPr lang="en-US" dirty="0">
+              <a:latin typeface="Arial" panose="020B0604020202020204" pitchFamily="34" charset="0"/>
+              <a:cs typeface="Arial" panose="020B0604020202020204" pitchFamily="34" charset="0"/>
+            </a:endParaRPr>
+          </a:p>
+        </p:txBody>
+      </p:sp>
+      <p:sp>
+        <p:nvSpPr>
+          <p:cNvPr id="5" name="Rectangle 4"/>
+          <p:cNvSpPr/>
+          <p:nvPr/>
+        </p:nvSpPr>
+        <p:spPr>
+          <a:xfrm>
+            <a:off x="3493616" y="6488668"/>
+            <a:ext cx="10818471" cy="307777"/>
+          </a:xfrm>
+          <a:prstGeom prst="rect">
+            <a:avLst/>
+          </a:prstGeom>
+        </p:spPr>
+        <p:txBody>
+          <a:bodyPr wrap="square">
+            <a:spAutoFit/>
+          </a:bodyPr>
+          <a:lstStyle/>
+          <a:p>
+            <a:r>
+              <a:rPr lang="en-US" sz="1400" dirty="0">
+                <a:latin typeface="Arial" panose="020B0604020202020204" pitchFamily="34" charset="0"/>
+                <a:cs typeface="Arial" panose="020B0604020202020204" pitchFamily="34" charset="0"/>
+              </a:rPr>
+              <a:t>https://github.com/afodor/metagenomicsTools/blob/master/src/classExamples/ch2018/quickNormalization.txt</a:t>
+            </a:r>
+          </a:p>
+        </p:txBody>
+      </p:sp>
+      <p:pic>
+        <p:nvPicPr>
+          <p:cNvPr id="6" name="Picture 5"/>
+          <p:cNvPicPr>
+            <a:picLocks noChangeAspect="1"/>
+          </p:cNvPicPr>
+          <p:nvPr/>
+        </p:nvPicPr>
+        <p:blipFill>
+          <a:blip r:embed="rId2"/>
+          <a:stretch>
+            <a:fillRect/>
+          </a:stretch>
+        </p:blipFill>
+        <p:spPr>
+          <a:xfrm>
+            <a:off x="851041" y="576503"/>
+            <a:ext cx="10310260" cy="5419183"/>
+          </a:xfrm>
+          <a:prstGeom prst="rect">
+            <a:avLst/>
+          </a:prstGeom>
+        </p:spPr>
+      </p:pic>
+    </p:spTree>
+    <p:extLst>
+      <p:ext uri="{BB962C8B-B14F-4D97-AF65-F5344CB8AC3E}">
+        <p14:creationId xmlns:p14="http://schemas.microsoft.com/office/powerpoint/2010/main" val="3076297033"/>
+      </p:ext>
+    </p:extLst>
+  </p:cSld>
+  <p:clrMapOvr>
+    <a:masterClrMapping/>
+  </p:clrMapOvr>
+  <p:timing>
+    <p:tnLst>
+      <p:par>
+        <p:cTn id="1" dur="indefinite" restart="never" nodeType="tmRoot"/>
+      </p:par>
+    </p:tnLst>
+  </p:timing>
+</p:sld>
+</file>
+
+<file path=ppt/slides/slide13.xml><?xml version="1.0" encoding="utf-8"?>
+<p:sld xmlns:a="http://schemas.openxmlformats.org/drawingml/2006/main" xmlns:r="http://schemas.openxmlformats.org/officeDocument/2006/relationships" xmlns:p="http://schemas.openxmlformats.org/presentationml/2006/main">
+  <p:cSld>
+    <p:spTree>
+      <p:nvGrpSpPr>
+        <p:cNvPr id="1" name=""/>
+        <p:cNvGrpSpPr/>
+        <p:nvPr/>
+      </p:nvGrpSpPr>
+      <p:grpSpPr>
+        <a:xfrm>
+          <a:off x="0" y="0"/>
+          <a:ext cx="0" cy="0"/>
+          <a:chOff x="0" y="0"/>
+          <a:chExt cx="0" cy="0"/>
+        </a:xfrm>
+      </p:grpSpPr>
+      <p:sp>
+        <p:nvSpPr>
+          <p:cNvPr id="4" name="TextBox 3"/>
+          <p:cNvSpPr txBox="1"/>
+          <p:nvPr/>
+        </p:nvSpPr>
+        <p:spPr>
+          <a:xfrm>
+            <a:off x="381966" y="144684"/>
+            <a:ext cx="5493812" cy="369332"/>
+          </a:xfrm>
+          <a:prstGeom prst="rect">
+            <a:avLst/>
+          </a:prstGeom>
+          <a:noFill/>
+        </p:spPr>
+        <p:txBody>
+          <a:bodyPr wrap="none" rtlCol="0">
+            <a:spAutoFit/>
+          </a:bodyPr>
+          <a:lstStyle/>
+          <a:p>
+            <a:r>
+              <a:rPr lang="en-US" dirty="0" smtClean="0">
+                <a:latin typeface="Arial" panose="020B0604020202020204" pitchFamily="34" charset="0"/>
+                <a:cs typeface="Arial" panose="020B0604020202020204" pitchFamily="34" charset="0"/>
+              </a:rPr>
+              <a:t>The first few lines input the file we wish to normalize</a:t>
+            </a:r>
+            <a:endParaRPr lang="en-US" dirty="0">
+              <a:latin typeface="Arial" panose="020B0604020202020204" pitchFamily="34" charset="0"/>
+              <a:cs typeface="Arial" panose="020B0604020202020204" pitchFamily="34" charset="0"/>
+            </a:endParaRPr>
+          </a:p>
+        </p:txBody>
+      </p:sp>
+      <p:pic>
+        <p:nvPicPr>
+          <p:cNvPr id="5" name="Picture 4"/>
+          <p:cNvPicPr>
+            <a:picLocks noChangeAspect="1"/>
+          </p:cNvPicPr>
+          <p:nvPr/>
+        </p:nvPicPr>
+        <p:blipFill>
+          <a:blip r:embed="rId2"/>
+          <a:stretch>
+            <a:fillRect/>
+          </a:stretch>
+        </p:blipFill>
+        <p:spPr>
+          <a:xfrm>
+            <a:off x="190982" y="908732"/>
+            <a:ext cx="12405528" cy="2502751"/>
+          </a:xfrm>
+          <a:prstGeom prst="rect">
+            <a:avLst/>
+          </a:prstGeom>
+        </p:spPr>
+      </p:pic>
+    </p:spTree>
+    <p:extLst>
+      <p:ext uri="{BB962C8B-B14F-4D97-AF65-F5344CB8AC3E}">
+        <p14:creationId xmlns:p14="http://schemas.microsoft.com/office/powerpoint/2010/main" val="944499620"/>
+      </p:ext>
+    </p:extLst>
+  </p:cSld>
+  <p:clrMapOvr>
+    <a:masterClrMapping/>
+  </p:clrMapOvr>
+  <p:timing>
+    <p:tnLst>
+      <p:par>
+        <p:cTn id="1" dur="indefinite" restart="never" nodeType="tmRoot"/>
+      </p:par>
+    </p:tnLst>
+  </p:timing>
+</p:sld>
+</file>
+
+<file path=ppt/slides/slide14.xml><?xml version="1.0" encoding="utf-8"?>
+<p:sld xmlns:a="http://schemas.openxmlformats.org/drawingml/2006/main" xmlns:r="http://schemas.openxmlformats.org/officeDocument/2006/relationships" xmlns:p="http://schemas.openxmlformats.org/presentationml/2006/main">
+  <p:cSld>
+    <p:spTree>
+      <p:nvGrpSpPr>
+        <p:cNvPr id="1" name=""/>
+        <p:cNvGrpSpPr/>
+        <p:nvPr/>
+      </p:nvGrpSpPr>
+      <p:grpSpPr>
+        <a:xfrm>
+          <a:off x="0" y="0"/>
+          <a:ext cx="0" cy="0"/>
+          <a:chOff x="0" y="0"/>
+          <a:chExt cx="0" cy="0"/>
+        </a:xfrm>
+      </p:grpSpPr>
+      <p:pic>
+        <p:nvPicPr>
+          <p:cNvPr id="5" name="Picture 4"/>
+          <p:cNvPicPr>
+            <a:picLocks noChangeAspect="1"/>
+          </p:cNvPicPr>
+          <p:nvPr/>
+        </p:nvPicPr>
+        <p:blipFill>
+          <a:blip r:embed="rId2"/>
+          <a:stretch>
+            <a:fillRect/>
+          </a:stretch>
+        </p:blipFill>
+        <p:spPr>
+          <a:xfrm>
+            <a:off x="358815" y="801764"/>
+            <a:ext cx="9126758" cy="5886351"/>
+          </a:xfrm>
+          <a:prstGeom prst="rect">
+            <a:avLst/>
+          </a:prstGeom>
+        </p:spPr>
+      </p:pic>
+      <p:sp>
+        <p:nvSpPr>
+          <p:cNvPr id="6" name="TextBox 5"/>
+          <p:cNvSpPr txBox="1"/>
+          <p:nvPr/>
+        </p:nvSpPr>
+        <p:spPr>
+          <a:xfrm>
+            <a:off x="682906" y="23151"/>
+            <a:ext cx="9110186" cy="646331"/>
+          </a:xfrm>
+          <a:prstGeom prst="rect">
+            <a:avLst/>
+          </a:prstGeom>
+          <a:noFill/>
+        </p:spPr>
+        <p:txBody>
+          <a:bodyPr wrap="none" rtlCol="0">
+            <a:spAutoFit/>
+          </a:bodyPr>
+          <a:lstStyle/>
+          <a:p>
+            <a:r>
+              <a:rPr lang="en-US" dirty="0" smtClean="0">
+                <a:latin typeface="Arial" panose="020B0604020202020204" pitchFamily="34" charset="0"/>
+                <a:cs typeface="Arial" panose="020B0604020202020204" pitchFamily="34" charset="0"/>
+              </a:rPr>
+              <a:t>On Windows (but not necessarily in Macs or in R-studio, I get this nice view when I type</a:t>
+            </a:r>
+          </a:p>
+          <a:p>
+            <a:r>
+              <a:rPr lang="en-US" dirty="0" smtClean="0">
+                <a:latin typeface="Arial" panose="020B0604020202020204" pitchFamily="34" charset="0"/>
+                <a:cs typeface="Arial" panose="020B0604020202020204" pitchFamily="34" charset="0"/>
+              </a:rPr>
+              <a:t>                                                                 </a:t>
+            </a:r>
+            <a:r>
+              <a:rPr lang="en-US" dirty="0" smtClean="0">
+                <a:solidFill>
+                  <a:srgbClr val="FF0000"/>
+                </a:solidFill>
+                <a:latin typeface="Arial" panose="020B0604020202020204" pitchFamily="34" charset="0"/>
+                <a:cs typeface="Arial" panose="020B0604020202020204" pitchFamily="34" charset="0"/>
+              </a:rPr>
+              <a:t>edit(</a:t>
+            </a:r>
+            <a:r>
+              <a:rPr lang="en-US" dirty="0" err="1" smtClean="0">
+                <a:solidFill>
+                  <a:srgbClr val="FF0000"/>
+                </a:solidFill>
+                <a:latin typeface="Arial" panose="020B0604020202020204" pitchFamily="34" charset="0"/>
+                <a:cs typeface="Arial" panose="020B0604020202020204" pitchFamily="34" charset="0"/>
+              </a:rPr>
+              <a:t>myT</a:t>
+            </a:r>
+            <a:r>
+              <a:rPr lang="en-US" dirty="0" smtClean="0">
+                <a:solidFill>
+                  <a:srgbClr val="FF0000"/>
+                </a:solidFill>
+                <a:latin typeface="Arial" panose="020B0604020202020204" pitchFamily="34" charset="0"/>
+                <a:cs typeface="Arial" panose="020B0604020202020204" pitchFamily="34" charset="0"/>
+              </a:rPr>
+              <a:t>)</a:t>
+            </a:r>
+            <a:endParaRPr lang="en-US" dirty="0">
+              <a:solidFill>
+                <a:srgbClr val="FF0000"/>
+              </a:solidFill>
+              <a:latin typeface="Arial" panose="020B0604020202020204" pitchFamily="34" charset="0"/>
+              <a:cs typeface="Arial" panose="020B0604020202020204" pitchFamily="34" charset="0"/>
+            </a:endParaRPr>
+          </a:p>
+        </p:txBody>
+      </p:sp>
+      <p:sp>
+        <p:nvSpPr>
+          <p:cNvPr id="7" name="TextBox 6"/>
+          <p:cNvSpPr txBox="1"/>
+          <p:nvPr/>
+        </p:nvSpPr>
+        <p:spPr>
+          <a:xfrm>
+            <a:off x="9630138" y="1452623"/>
+            <a:ext cx="2604111" cy="4247317"/>
+          </a:xfrm>
+          <a:prstGeom prst="rect">
+            <a:avLst/>
+          </a:prstGeom>
+          <a:noFill/>
+        </p:spPr>
+        <p:txBody>
+          <a:bodyPr wrap="none" rtlCol="0">
+            <a:spAutoFit/>
+          </a:bodyPr>
+          <a:lstStyle/>
+          <a:p>
+            <a:r>
+              <a:rPr lang="en-US" dirty="0" smtClean="0">
+                <a:latin typeface="Arial" panose="020B0604020202020204" pitchFamily="34" charset="0"/>
+                <a:cs typeface="Arial" panose="020B0604020202020204" pitchFamily="34" charset="0"/>
+              </a:rPr>
+              <a:t>Interestingly, changes I </a:t>
+            </a:r>
+          </a:p>
+          <a:p>
+            <a:r>
+              <a:rPr lang="en-US" dirty="0" smtClean="0">
+                <a:latin typeface="Arial" panose="020B0604020202020204" pitchFamily="34" charset="0"/>
+                <a:cs typeface="Arial" panose="020B0604020202020204" pitchFamily="34" charset="0"/>
+              </a:rPr>
+              <a:t>type here don’t persist.</a:t>
+            </a:r>
+          </a:p>
+          <a:p>
+            <a:endParaRPr lang="en-US" dirty="0">
+              <a:latin typeface="Arial" panose="020B0604020202020204" pitchFamily="34" charset="0"/>
+              <a:cs typeface="Arial" panose="020B0604020202020204" pitchFamily="34" charset="0"/>
+            </a:endParaRPr>
+          </a:p>
+          <a:p>
+            <a:r>
+              <a:rPr lang="en-US" dirty="0" smtClean="0">
+                <a:latin typeface="Arial" panose="020B0604020202020204" pitchFamily="34" charset="0"/>
+                <a:cs typeface="Arial" panose="020B0604020202020204" pitchFamily="34" charset="0"/>
+              </a:rPr>
+              <a:t>(I would have to type</a:t>
+            </a:r>
+          </a:p>
+          <a:p>
+            <a:endParaRPr lang="en-US" dirty="0">
+              <a:latin typeface="Arial" panose="020B0604020202020204" pitchFamily="34" charset="0"/>
+              <a:cs typeface="Arial" panose="020B0604020202020204" pitchFamily="34" charset="0"/>
+            </a:endParaRPr>
+          </a:p>
+          <a:p>
+            <a:r>
+              <a:rPr lang="en-US" dirty="0" err="1" smtClean="0">
+                <a:latin typeface="Arial" panose="020B0604020202020204" pitchFamily="34" charset="0"/>
+                <a:cs typeface="Arial" panose="020B0604020202020204" pitchFamily="34" charset="0"/>
+              </a:rPr>
+              <a:t>myT</a:t>
+            </a:r>
+            <a:r>
+              <a:rPr lang="en-US" dirty="0" smtClean="0">
+                <a:latin typeface="Arial" panose="020B0604020202020204" pitchFamily="34" charset="0"/>
+                <a:cs typeface="Arial" panose="020B0604020202020204" pitchFamily="34" charset="0"/>
+              </a:rPr>
+              <a:t> &lt;- edit(</a:t>
+            </a:r>
+            <a:r>
+              <a:rPr lang="en-US" dirty="0" err="1" smtClean="0">
+                <a:latin typeface="Arial" panose="020B0604020202020204" pitchFamily="34" charset="0"/>
+                <a:cs typeface="Arial" panose="020B0604020202020204" pitchFamily="34" charset="0"/>
+              </a:rPr>
+              <a:t>myT</a:t>
+            </a:r>
+            <a:r>
+              <a:rPr lang="en-US" dirty="0" smtClean="0">
+                <a:latin typeface="Arial" panose="020B0604020202020204" pitchFamily="34" charset="0"/>
+                <a:cs typeface="Arial" panose="020B0604020202020204" pitchFamily="34" charset="0"/>
+              </a:rPr>
+              <a:t>))</a:t>
+            </a:r>
+          </a:p>
+          <a:p>
+            <a:endParaRPr lang="en-US" dirty="0">
+              <a:latin typeface="Arial" panose="020B0604020202020204" pitchFamily="34" charset="0"/>
+              <a:cs typeface="Arial" panose="020B0604020202020204" pitchFamily="34" charset="0"/>
+            </a:endParaRPr>
+          </a:p>
+          <a:p>
+            <a:r>
+              <a:rPr lang="en-US" dirty="0" smtClean="0">
+                <a:latin typeface="Arial" panose="020B0604020202020204" pitchFamily="34" charset="0"/>
+                <a:cs typeface="Arial" panose="020B0604020202020204" pitchFamily="34" charset="0"/>
+              </a:rPr>
+              <a:t>to have the changes</a:t>
+            </a:r>
+          </a:p>
+          <a:p>
+            <a:r>
+              <a:rPr lang="en-US" dirty="0" smtClean="0">
+                <a:latin typeface="Arial" panose="020B0604020202020204" pitchFamily="34" charset="0"/>
+                <a:cs typeface="Arial" panose="020B0604020202020204" pitchFamily="34" charset="0"/>
+              </a:rPr>
+              <a:t>I type into the </a:t>
+            </a:r>
+          </a:p>
+          <a:p>
+            <a:r>
+              <a:rPr lang="en-US" dirty="0" smtClean="0">
+                <a:latin typeface="Arial" panose="020B0604020202020204" pitchFamily="34" charset="0"/>
+                <a:cs typeface="Arial" panose="020B0604020202020204" pitchFamily="34" charset="0"/>
+              </a:rPr>
+              <a:t>spreadsheet stick.</a:t>
+            </a:r>
+          </a:p>
+          <a:p>
+            <a:endParaRPr lang="en-US" dirty="0" smtClean="0">
+              <a:latin typeface="Arial" panose="020B0604020202020204" pitchFamily="34" charset="0"/>
+              <a:cs typeface="Arial" panose="020B0604020202020204" pitchFamily="34" charset="0"/>
+            </a:endParaRPr>
+          </a:p>
+          <a:p>
+            <a:r>
+              <a:rPr lang="en-US" dirty="0" smtClean="0">
+                <a:latin typeface="Arial" panose="020B0604020202020204" pitchFamily="34" charset="0"/>
+                <a:cs typeface="Arial" panose="020B0604020202020204" pitchFamily="34" charset="0"/>
+              </a:rPr>
+              <a:t>This is because data</a:t>
+            </a:r>
+          </a:p>
+          <a:p>
+            <a:r>
+              <a:rPr lang="en-US" dirty="0" smtClean="0">
+                <a:latin typeface="Arial" panose="020B0604020202020204" pitchFamily="34" charset="0"/>
+                <a:cs typeface="Arial" panose="020B0604020202020204" pitchFamily="34" charset="0"/>
+              </a:rPr>
+              <a:t>structures in R are </a:t>
+            </a:r>
+          </a:p>
+          <a:p>
+            <a:r>
+              <a:rPr lang="en-US" dirty="0" smtClean="0">
+                <a:latin typeface="Arial" panose="020B0604020202020204" pitchFamily="34" charset="0"/>
+                <a:cs typeface="Arial" panose="020B0604020202020204" pitchFamily="34" charset="0"/>
+              </a:rPr>
+              <a:t>Immutable!</a:t>
+            </a:r>
+          </a:p>
+          <a:p>
+            <a:endParaRPr lang="en-US" dirty="0" smtClean="0">
+              <a:latin typeface="Arial" panose="020B0604020202020204" pitchFamily="34" charset="0"/>
+              <a:cs typeface="Arial" panose="020B0604020202020204" pitchFamily="34" charset="0"/>
+            </a:endParaRPr>
+          </a:p>
+        </p:txBody>
+      </p:sp>
+    </p:spTree>
+    <p:extLst>
+      <p:ext uri="{BB962C8B-B14F-4D97-AF65-F5344CB8AC3E}">
+        <p14:creationId xmlns:p14="http://schemas.microsoft.com/office/powerpoint/2010/main" val="3192531913"/>
+      </p:ext>
+    </p:extLst>
+  </p:cSld>
+  <p:clrMapOvr>
+    <a:masterClrMapping/>
+  </p:clrMapOvr>
+  <p:timing>
+    <p:tnLst>
+      <p:par>
+        <p:cTn id="1" dur="indefinite" restart="never" nodeType="tmRoot"/>
+      </p:par>
+    </p:tnLst>
+  </p:timing>
+</p:sld>
+</file>
+
+<file path=ppt/slides/slide15.xml><?xml version="1.0" encoding="utf-8"?>
+<p:sld xmlns:a="http://schemas.openxmlformats.org/drawingml/2006/main" xmlns:r="http://schemas.openxmlformats.org/officeDocument/2006/relationships" xmlns:p="http://schemas.openxmlformats.org/presentationml/2006/main">
+  <p:cSld>
+    <p:spTree>
+      <p:nvGrpSpPr>
+        <p:cNvPr id="1" name=""/>
+        <p:cNvGrpSpPr/>
+        <p:nvPr/>
+      </p:nvGrpSpPr>
+      <p:grpSpPr>
+        <a:xfrm>
+          <a:off x="0" y="0"/>
+          <a:ext cx="0" cy="0"/>
+          <a:chOff x="0" y="0"/>
+          <a:chExt cx="0" cy="0"/>
+        </a:xfrm>
+      </p:grpSpPr>
+      <p:sp>
+        <p:nvSpPr>
+          <p:cNvPr id="4" name="TextBox 3"/>
+          <p:cNvSpPr txBox="1"/>
+          <p:nvPr/>
+        </p:nvSpPr>
+        <p:spPr>
+          <a:xfrm>
+            <a:off x="694481" y="486137"/>
+            <a:ext cx="4814138" cy="1200329"/>
+          </a:xfrm>
+          <a:prstGeom prst="rect">
+            <a:avLst/>
+          </a:prstGeom>
+          <a:noFill/>
+        </p:spPr>
+        <p:txBody>
+          <a:bodyPr wrap="none" rtlCol="0">
+            <a:spAutoFit/>
+          </a:bodyPr>
+          <a:lstStyle/>
+          <a:p>
+            <a:r>
+              <a:rPr lang="en-US" dirty="0" smtClean="0">
+                <a:latin typeface="Arial" panose="020B0604020202020204" pitchFamily="34" charset="0"/>
+                <a:cs typeface="Arial" panose="020B0604020202020204" pitchFamily="34" charset="0"/>
+              </a:rPr>
+              <a:t>If I type </a:t>
+            </a:r>
+          </a:p>
+          <a:p>
+            <a:r>
+              <a:rPr lang="en-US" dirty="0">
+                <a:latin typeface="Arial" panose="020B0604020202020204" pitchFamily="34" charset="0"/>
+                <a:cs typeface="Arial" panose="020B0604020202020204" pitchFamily="34" charset="0"/>
+              </a:rPr>
+              <a:t>	</a:t>
+            </a:r>
+            <a:r>
+              <a:rPr lang="en-US" dirty="0" err="1" smtClean="0">
+                <a:latin typeface="Arial" panose="020B0604020202020204" pitchFamily="34" charset="0"/>
+                <a:cs typeface="Arial" panose="020B0604020202020204" pitchFamily="34" charset="0"/>
+              </a:rPr>
+              <a:t>rowSums</a:t>
+            </a:r>
+            <a:r>
+              <a:rPr lang="en-US" dirty="0" smtClean="0">
+                <a:latin typeface="Arial" panose="020B0604020202020204" pitchFamily="34" charset="0"/>
+                <a:cs typeface="Arial" panose="020B0604020202020204" pitchFamily="34" charset="0"/>
+              </a:rPr>
+              <a:t>(</a:t>
+            </a:r>
+            <a:r>
+              <a:rPr lang="en-US" dirty="0" err="1" smtClean="0">
+                <a:latin typeface="Arial" panose="020B0604020202020204" pitchFamily="34" charset="0"/>
+                <a:cs typeface="Arial" panose="020B0604020202020204" pitchFamily="34" charset="0"/>
+              </a:rPr>
+              <a:t>myT</a:t>
+            </a:r>
+            <a:r>
+              <a:rPr lang="en-US" dirty="0" smtClean="0">
+                <a:latin typeface="Arial" panose="020B0604020202020204" pitchFamily="34" charset="0"/>
+                <a:cs typeface="Arial" panose="020B0604020202020204" pitchFamily="34" charset="0"/>
+              </a:rPr>
+              <a:t>)</a:t>
+            </a:r>
+          </a:p>
+          <a:p>
+            <a:endParaRPr lang="en-US" dirty="0">
+              <a:latin typeface="Arial" panose="020B0604020202020204" pitchFamily="34" charset="0"/>
+              <a:cs typeface="Arial" panose="020B0604020202020204" pitchFamily="34" charset="0"/>
+            </a:endParaRPr>
+          </a:p>
+          <a:p>
+            <a:r>
+              <a:rPr lang="en-US" dirty="0" smtClean="0">
+                <a:latin typeface="Arial" panose="020B0604020202020204" pitchFamily="34" charset="0"/>
+                <a:cs typeface="Arial" panose="020B0604020202020204" pitchFamily="34" charset="0"/>
+              </a:rPr>
+              <a:t>R gives me the sequencing depth per sample</a:t>
+            </a:r>
+            <a:endParaRPr lang="en-US" dirty="0">
+              <a:latin typeface="Arial" panose="020B0604020202020204" pitchFamily="34" charset="0"/>
+              <a:cs typeface="Arial" panose="020B0604020202020204" pitchFamily="34" charset="0"/>
+            </a:endParaRPr>
+          </a:p>
+        </p:txBody>
+      </p:sp>
+      <p:pic>
+        <p:nvPicPr>
+          <p:cNvPr id="5" name="Picture 4"/>
+          <p:cNvPicPr>
+            <a:picLocks noChangeAspect="1"/>
+          </p:cNvPicPr>
+          <p:nvPr/>
+        </p:nvPicPr>
+        <p:blipFill>
+          <a:blip r:embed="rId2"/>
+          <a:stretch>
+            <a:fillRect/>
+          </a:stretch>
+        </p:blipFill>
+        <p:spPr>
+          <a:xfrm>
+            <a:off x="1180617" y="1858733"/>
+            <a:ext cx="8979075" cy="4484193"/>
+          </a:xfrm>
+          <a:prstGeom prst="rect">
+            <a:avLst/>
+          </a:prstGeom>
+        </p:spPr>
+      </p:pic>
+    </p:spTree>
+    <p:extLst>
+      <p:ext uri="{BB962C8B-B14F-4D97-AF65-F5344CB8AC3E}">
+        <p14:creationId xmlns:p14="http://schemas.microsoft.com/office/powerpoint/2010/main" val="856042151"/>
+      </p:ext>
+    </p:extLst>
+  </p:cSld>
+  <p:clrMapOvr>
+    <a:masterClrMapping/>
+  </p:clrMapOvr>
+  <p:timing>
+    <p:tnLst>
+      <p:par>
+        <p:cTn id="1" dur="indefinite" restart="never" nodeType="tmRoot"/>
+      </p:par>
+    </p:tnLst>
+  </p:timing>
+</p:sld>
+</file>
+
+<file path=ppt/slides/slide16.xml><?xml version="1.0" encoding="utf-8"?>
+<p:sld xmlns:a="http://schemas.openxmlformats.org/drawingml/2006/main" xmlns:r="http://schemas.openxmlformats.org/officeDocument/2006/relationships" xmlns:p="http://schemas.openxmlformats.org/presentationml/2006/main">
+  <p:cSld>
+    <p:spTree>
+      <p:nvGrpSpPr>
+        <p:cNvPr id="1" name=""/>
+        <p:cNvGrpSpPr/>
+        <p:nvPr/>
+      </p:nvGrpSpPr>
+      <p:grpSpPr>
+        <a:xfrm>
+          <a:off x="0" y="0"/>
+          <a:ext cx="0" cy="0"/>
+          <a:chOff x="0" y="0"/>
+          <a:chExt cx="0" cy="0"/>
+        </a:xfrm>
+      </p:grpSpPr>
+      <p:sp>
+        <p:nvSpPr>
+          <p:cNvPr id="4" name="TextBox 3"/>
+          <p:cNvSpPr txBox="1"/>
+          <p:nvPr/>
+        </p:nvSpPr>
+        <p:spPr>
+          <a:xfrm>
+            <a:off x="219919" y="214133"/>
+            <a:ext cx="9105954" cy="1200329"/>
+          </a:xfrm>
+          <a:prstGeom prst="rect">
+            <a:avLst/>
+          </a:prstGeom>
+          <a:noFill/>
+        </p:spPr>
+        <p:txBody>
+          <a:bodyPr wrap="none" rtlCol="0">
+            <a:spAutoFit/>
+          </a:bodyPr>
+          <a:lstStyle/>
+          <a:p>
+            <a:r>
+              <a:rPr lang="en-US" dirty="0" smtClean="0">
+                <a:latin typeface="Arial" panose="020B0604020202020204" pitchFamily="34" charset="0"/>
+                <a:cs typeface="Arial" panose="020B0604020202020204" pitchFamily="34" charset="0"/>
+              </a:rPr>
+              <a:t>If I type  </a:t>
+            </a:r>
+          </a:p>
+          <a:p>
+            <a:r>
+              <a:rPr lang="en-US" dirty="0">
+                <a:latin typeface="Arial" panose="020B0604020202020204" pitchFamily="34" charset="0"/>
+                <a:cs typeface="Arial" panose="020B0604020202020204" pitchFamily="34" charset="0"/>
+              </a:rPr>
+              <a:t>	</a:t>
+            </a:r>
+            <a:r>
+              <a:rPr lang="en-US" dirty="0" err="1" smtClean="0">
+                <a:latin typeface="Arial" panose="020B0604020202020204" pitchFamily="34" charset="0"/>
+                <a:cs typeface="Arial" panose="020B0604020202020204" pitchFamily="34" charset="0"/>
+              </a:rPr>
+              <a:t>hist</a:t>
+            </a:r>
+            <a:r>
+              <a:rPr lang="en-US" dirty="0" smtClean="0">
+                <a:latin typeface="Arial" panose="020B0604020202020204" pitchFamily="34" charset="0"/>
+                <a:cs typeface="Arial" panose="020B0604020202020204" pitchFamily="34" charset="0"/>
+              </a:rPr>
+              <a:t>(</a:t>
+            </a:r>
+            <a:r>
+              <a:rPr lang="en-US" dirty="0" err="1" smtClean="0">
+                <a:latin typeface="Arial" panose="020B0604020202020204" pitchFamily="34" charset="0"/>
+                <a:cs typeface="Arial" panose="020B0604020202020204" pitchFamily="34" charset="0"/>
+              </a:rPr>
+              <a:t>rowSums</a:t>
+            </a:r>
+            <a:r>
+              <a:rPr lang="en-US" dirty="0" smtClean="0">
+                <a:latin typeface="Arial" panose="020B0604020202020204" pitchFamily="34" charset="0"/>
+                <a:cs typeface="Arial" panose="020B0604020202020204" pitchFamily="34" charset="0"/>
+              </a:rPr>
+              <a:t>(</a:t>
+            </a:r>
+            <a:r>
+              <a:rPr lang="en-US" dirty="0" err="1" smtClean="0">
+                <a:latin typeface="Arial" panose="020B0604020202020204" pitchFamily="34" charset="0"/>
+                <a:cs typeface="Arial" panose="020B0604020202020204" pitchFamily="34" charset="0"/>
+              </a:rPr>
+              <a:t>myT</a:t>
+            </a:r>
+            <a:r>
+              <a:rPr lang="en-US" dirty="0" smtClean="0">
+                <a:latin typeface="Arial" panose="020B0604020202020204" pitchFamily="34" charset="0"/>
+                <a:cs typeface="Arial" panose="020B0604020202020204" pitchFamily="34" charset="0"/>
+              </a:rPr>
+              <a:t>)) </a:t>
+            </a:r>
+          </a:p>
+          <a:p>
+            <a:endParaRPr lang="en-US" dirty="0">
+              <a:latin typeface="Arial" panose="020B0604020202020204" pitchFamily="34" charset="0"/>
+              <a:cs typeface="Arial" panose="020B0604020202020204" pitchFamily="34" charset="0"/>
+            </a:endParaRPr>
+          </a:p>
+          <a:p>
+            <a:r>
+              <a:rPr lang="en-US" dirty="0" smtClean="0">
+                <a:latin typeface="Arial" panose="020B0604020202020204" pitchFamily="34" charset="0"/>
+                <a:cs typeface="Arial" panose="020B0604020202020204" pitchFamily="34" charset="0"/>
+              </a:rPr>
+              <a:t>I get a nice graphic of my sequencing depth per sample.  Very easy, informative QA/QC</a:t>
+            </a:r>
+            <a:endParaRPr lang="en-US" dirty="0">
+              <a:latin typeface="Arial" panose="020B0604020202020204" pitchFamily="34" charset="0"/>
+              <a:cs typeface="Arial" panose="020B0604020202020204" pitchFamily="34" charset="0"/>
+            </a:endParaRPr>
+          </a:p>
+        </p:txBody>
+      </p:sp>
+      <p:pic>
+        <p:nvPicPr>
+          <p:cNvPr id="5" name="Picture 4"/>
+          <p:cNvPicPr>
+            <a:picLocks noChangeAspect="1"/>
+          </p:cNvPicPr>
+          <p:nvPr/>
+        </p:nvPicPr>
+        <p:blipFill>
+          <a:blip r:embed="rId2"/>
+          <a:stretch>
+            <a:fillRect/>
+          </a:stretch>
+        </p:blipFill>
+        <p:spPr>
+          <a:xfrm>
+            <a:off x="1941572" y="1701479"/>
+            <a:ext cx="7434043" cy="4582308"/>
+          </a:xfrm>
+          <a:prstGeom prst="rect">
+            <a:avLst/>
+          </a:prstGeom>
+        </p:spPr>
+      </p:pic>
+    </p:spTree>
+    <p:extLst>
+      <p:ext uri="{BB962C8B-B14F-4D97-AF65-F5344CB8AC3E}">
+        <p14:creationId xmlns:p14="http://schemas.microsoft.com/office/powerpoint/2010/main" val="2132430840"/>
+      </p:ext>
+    </p:extLst>
+  </p:cSld>
+  <p:clrMapOvr>
+    <a:masterClrMapping/>
+  </p:clrMapOvr>
+  <p:timing>
+    <p:tnLst>
+      <p:par>
+        <p:cTn id="1" dur="indefinite" restart="never" nodeType="tmRoot"/>
+      </p:par>
+    </p:tnLst>
+  </p:timing>
+</p:sld>
+</file>
+
+<file path=ppt/slides/slide17.xml><?xml version="1.0" encoding="utf-8"?>
+<p:sld xmlns:a="http://schemas.openxmlformats.org/drawingml/2006/main" xmlns:r="http://schemas.openxmlformats.org/officeDocument/2006/relationships" xmlns:p="http://schemas.openxmlformats.org/presentationml/2006/main">
+  <p:cSld>
+    <p:spTree>
+      <p:nvGrpSpPr>
+        <p:cNvPr id="1" name=""/>
+        <p:cNvGrpSpPr/>
+        <p:nvPr/>
+      </p:nvGrpSpPr>
+      <p:grpSpPr>
+        <a:xfrm>
+          <a:off x="0" y="0"/>
+          <a:ext cx="0" cy="0"/>
+          <a:chOff x="0" y="0"/>
+          <a:chExt cx="0" cy="0"/>
+        </a:xfrm>
+      </p:grpSpPr>
+      <p:pic>
+        <p:nvPicPr>
+          <p:cNvPr id="4" name="Picture 3"/>
+          <p:cNvPicPr>
+            <a:picLocks noChangeAspect="1"/>
+          </p:cNvPicPr>
+          <p:nvPr/>
+        </p:nvPicPr>
+        <p:blipFill>
+          <a:blip r:embed="rId2"/>
+          <a:stretch>
+            <a:fillRect/>
+          </a:stretch>
+        </p:blipFill>
+        <p:spPr>
+          <a:xfrm>
+            <a:off x="1006997" y="1355560"/>
+            <a:ext cx="8797000" cy="5070377"/>
+          </a:xfrm>
+          <a:prstGeom prst="rect">
+            <a:avLst/>
+          </a:prstGeom>
+        </p:spPr>
+      </p:pic>
+      <p:sp>
+        <p:nvSpPr>
+          <p:cNvPr id="5" name="TextBox 4"/>
+          <p:cNvSpPr txBox="1"/>
+          <p:nvPr/>
+        </p:nvSpPr>
+        <p:spPr>
+          <a:xfrm>
+            <a:off x="1238491" y="387753"/>
+            <a:ext cx="5027851" cy="369332"/>
+          </a:xfrm>
+          <a:prstGeom prst="rect">
+            <a:avLst/>
+          </a:prstGeom>
+          <a:noFill/>
+        </p:spPr>
+        <p:txBody>
+          <a:bodyPr wrap="none" rtlCol="0">
+            <a:spAutoFit/>
+          </a:bodyPr>
+          <a:lstStyle/>
+          <a:p>
+            <a:r>
+              <a:rPr lang="en-US" dirty="0" smtClean="0">
+                <a:latin typeface="Arial" panose="020B0604020202020204" pitchFamily="34" charset="0"/>
+                <a:cs typeface="Arial" panose="020B0604020202020204" pitchFamily="34" charset="0"/>
+              </a:rPr>
+              <a:t>Alternatively, I can easily switch to a log scale…</a:t>
+            </a:r>
+            <a:endParaRPr lang="en-US" dirty="0">
+              <a:latin typeface="Arial" panose="020B0604020202020204" pitchFamily="34" charset="0"/>
+              <a:cs typeface="Arial" panose="020B0604020202020204" pitchFamily="34" charset="0"/>
+            </a:endParaRPr>
+          </a:p>
+        </p:txBody>
+      </p:sp>
+    </p:spTree>
+    <p:extLst>
+      <p:ext uri="{BB962C8B-B14F-4D97-AF65-F5344CB8AC3E}">
+        <p14:creationId xmlns:p14="http://schemas.microsoft.com/office/powerpoint/2010/main" val="3164048424"/>
+      </p:ext>
+    </p:extLst>
+  </p:cSld>
+  <p:clrMapOvr>
+    <a:masterClrMapping/>
+  </p:clrMapOvr>
+  <p:timing>
+    <p:tnLst>
+      <p:par>
+        <p:cTn id="1" dur="indefinite" restart="never" nodeType="tmRoot"/>
+      </p:par>
+    </p:tnLst>
+  </p:timing>
+</p:sld>
+</file>
+
+<file path=ppt/slides/slide18.xml><?xml version="1.0" encoding="utf-8"?>
+<p:sld xmlns:a="http://schemas.openxmlformats.org/drawingml/2006/main" xmlns:r="http://schemas.openxmlformats.org/officeDocument/2006/relationships" xmlns:p="http://schemas.openxmlformats.org/presentationml/2006/main">
+  <p:cSld>
+    <p:spTree>
+      <p:nvGrpSpPr>
+        <p:cNvPr id="1" name=""/>
+        <p:cNvGrpSpPr/>
+        <p:nvPr/>
+      </p:nvGrpSpPr>
+      <p:grpSpPr>
+        <a:xfrm>
+          <a:off x="0" y="0"/>
+          <a:ext cx="0" cy="0"/>
+          <a:chOff x="0" y="0"/>
+          <a:chExt cx="0" cy="0"/>
+        </a:xfrm>
+      </p:grpSpPr>
+      <p:sp>
+        <p:nvSpPr>
+          <p:cNvPr id="4" name="TextBox 3"/>
+          <p:cNvSpPr txBox="1"/>
+          <p:nvPr/>
+        </p:nvSpPr>
+        <p:spPr>
+          <a:xfrm>
+            <a:off x="925980" y="144685"/>
+            <a:ext cx="6622326" cy="369332"/>
+          </a:xfrm>
+          <a:prstGeom prst="rect">
+            <a:avLst/>
+          </a:prstGeom>
+          <a:noFill/>
+        </p:spPr>
+        <p:txBody>
+          <a:bodyPr wrap="none" rtlCol="0">
+            <a:spAutoFit/>
+          </a:bodyPr>
+          <a:lstStyle/>
+          <a:p>
+            <a:r>
+              <a:rPr lang="en-US" dirty="0" smtClean="0">
+                <a:latin typeface="Arial" panose="020B0604020202020204" pitchFamily="34" charset="0"/>
+                <a:cs typeface="Arial" panose="020B0604020202020204" pitchFamily="34" charset="0"/>
+              </a:rPr>
+              <a:t>I can use the </a:t>
+            </a:r>
+            <a:r>
+              <a:rPr lang="en-US" dirty="0" err="1" smtClean="0">
+                <a:latin typeface="Arial" panose="020B0604020202020204" pitchFamily="34" charset="0"/>
+                <a:cs typeface="Arial" panose="020B0604020202020204" pitchFamily="34" charset="0"/>
+              </a:rPr>
+              <a:t>rowSums</a:t>
+            </a:r>
+            <a:r>
+              <a:rPr lang="en-US" dirty="0" smtClean="0">
+                <a:latin typeface="Arial" panose="020B0604020202020204" pitchFamily="34" charset="0"/>
+                <a:cs typeface="Arial" panose="020B0604020202020204" pitchFamily="34" charset="0"/>
+              </a:rPr>
+              <a:t> directly to switch to relative abundance </a:t>
+            </a:r>
+            <a:endParaRPr lang="en-US" dirty="0">
+              <a:latin typeface="Arial" panose="020B0604020202020204" pitchFamily="34" charset="0"/>
+              <a:cs typeface="Arial" panose="020B0604020202020204" pitchFamily="34" charset="0"/>
+            </a:endParaRPr>
+          </a:p>
+        </p:txBody>
+      </p:sp>
+      <p:pic>
+        <p:nvPicPr>
+          <p:cNvPr id="5" name="Picture 4"/>
+          <p:cNvPicPr>
+            <a:picLocks noChangeAspect="1"/>
+          </p:cNvPicPr>
+          <p:nvPr/>
+        </p:nvPicPr>
+        <p:blipFill>
+          <a:blip r:embed="rId2"/>
+          <a:stretch>
+            <a:fillRect/>
+          </a:stretch>
+        </p:blipFill>
+        <p:spPr>
+          <a:xfrm>
+            <a:off x="967992" y="724201"/>
+            <a:ext cx="9839325" cy="3476625"/>
+          </a:xfrm>
+          <a:prstGeom prst="rect">
+            <a:avLst/>
+          </a:prstGeom>
+        </p:spPr>
+      </p:pic>
+    </p:spTree>
+    <p:extLst>
+      <p:ext uri="{BB962C8B-B14F-4D97-AF65-F5344CB8AC3E}">
+        <p14:creationId xmlns:p14="http://schemas.microsoft.com/office/powerpoint/2010/main" val="2991187869"/>
+      </p:ext>
+    </p:extLst>
+  </p:cSld>
+  <p:clrMapOvr>
+    <a:masterClrMapping/>
+  </p:clrMapOvr>
+  <p:timing>
+    <p:tnLst>
+      <p:par>
+        <p:cTn id="1" dur="indefinite" restart="never" nodeType="tmRoot"/>
+      </p:par>
+    </p:tnLst>
+  </p:timing>
+</p:sld>
+</file>
+
+<file path=ppt/slides/slide19.xml><?xml version="1.0" encoding="utf-8"?>
+<p:sld xmlns:a="http://schemas.openxmlformats.org/drawingml/2006/main" xmlns:r="http://schemas.openxmlformats.org/officeDocument/2006/relationships" xmlns:p="http://schemas.openxmlformats.org/presentationml/2006/main">
+  <p:cSld>
+    <p:spTree>
+      <p:nvGrpSpPr>
+        <p:cNvPr id="1" name=""/>
+        <p:cNvGrpSpPr/>
+        <p:nvPr/>
+      </p:nvGrpSpPr>
+      <p:grpSpPr>
+        <a:xfrm>
+          <a:off x="0" y="0"/>
+          <a:ext cx="0" cy="0"/>
+          <a:chOff x="0" y="0"/>
+          <a:chExt cx="0" cy="0"/>
+        </a:xfrm>
+      </p:grpSpPr>
+      <p:pic>
+        <p:nvPicPr>
+          <p:cNvPr id="4" name="Picture 3"/>
+          <p:cNvPicPr>
+            <a:picLocks noChangeAspect="1"/>
+          </p:cNvPicPr>
+          <p:nvPr/>
+        </p:nvPicPr>
+        <p:blipFill>
+          <a:blip r:embed="rId2"/>
+          <a:stretch>
+            <a:fillRect/>
+          </a:stretch>
+        </p:blipFill>
+        <p:spPr>
+          <a:xfrm>
+            <a:off x="811687" y="1267430"/>
+            <a:ext cx="8697819" cy="4948116"/>
+          </a:xfrm>
+          <a:prstGeom prst="rect">
+            <a:avLst/>
+          </a:prstGeom>
+        </p:spPr>
+      </p:pic>
+      <p:sp>
+        <p:nvSpPr>
+          <p:cNvPr id="5" name="TextBox 4"/>
+          <p:cNvSpPr txBox="1"/>
+          <p:nvPr/>
+        </p:nvSpPr>
+        <p:spPr>
+          <a:xfrm>
+            <a:off x="1105382" y="364603"/>
+            <a:ext cx="6058069" cy="369332"/>
+          </a:xfrm>
+          <a:prstGeom prst="rect">
+            <a:avLst/>
+          </a:prstGeom>
+          <a:noFill/>
+        </p:spPr>
+        <p:txBody>
+          <a:bodyPr wrap="none" rtlCol="0">
+            <a:spAutoFit/>
+          </a:bodyPr>
+          <a:lstStyle/>
+          <a:p>
+            <a:r>
+              <a:rPr lang="en-US" dirty="0" smtClean="0">
+                <a:latin typeface="Arial" panose="020B0604020202020204" pitchFamily="34" charset="0"/>
+                <a:cs typeface="Arial" panose="020B0604020202020204" pitchFamily="34" charset="0"/>
+              </a:rPr>
+              <a:t>The </a:t>
+            </a:r>
+            <a:r>
+              <a:rPr lang="en-US" dirty="0" err="1" smtClean="0">
+                <a:latin typeface="Arial" panose="020B0604020202020204" pitchFamily="34" charset="0"/>
+                <a:cs typeface="Arial" panose="020B0604020202020204" pitchFamily="34" charset="0"/>
+              </a:rPr>
+              <a:t>rowSums</a:t>
+            </a:r>
+            <a:r>
+              <a:rPr lang="en-US" dirty="0" smtClean="0">
+                <a:latin typeface="Arial" panose="020B0604020202020204" pitchFamily="34" charset="0"/>
+                <a:cs typeface="Arial" panose="020B0604020202020204" pitchFamily="34" charset="0"/>
+              </a:rPr>
+              <a:t> on </a:t>
+            </a:r>
+            <a:r>
+              <a:rPr lang="en-US" dirty="0" err="1" smtClean="0">
+                <a:latin typeface="Arial" panose="020B0604020202020204" pitchFamily="34" charset="0"/>
+                <a:cs typeface="Arial" panose="020B0604020202020204" pitchFamily="34" charset="0"/>
+              </a:rPr>
+              <a:t>myTNorm</a:t>
+            </a:r>
+            <a:r>
+              <a:rPr lang="en-US" dirty="0" smtClean="0">
+                <a:latin typeface="Arial" panose="020B0604020202020204" pitchFamily="34" charset="0"/>
+                <a:cs typeface="Arial" panose="020B0604020202020204" pitchFamily="34" charset="0"/>
+              </a:rPr>
+              <a:t> should all be 1 (and they are)</a:t>
+            </a:r>
+            <a:endParaRPr lang="en-US" dirty="0">
+              <a:latin typeface="Arial" panose="020B0604020202020204" pitchFamily="34" charset="0"/>
+              <a:cs typeface="Arial" panose="020B0604020202020204" pitchFamily="34" charset="0"/>
+            </a:endParaRPr>
+          </a:p>
+        </p:txBody>
+      </p:sp>
+    </p:spTree>
+    <p:extLst>
+      <p:ext uri="{BB962C8B-B14F-4D97-AF65-F5344CB8AC3E}">
+        <p14:creationId xmlns:p14="http://schemas.microsoft.com/office/powerpoint/2010/main" val="117911369"/>
+      </p:ext>
+    </p:extLst>
+  </p:cSld>
+  <p:clrMapOvr>
+    <a:masterClrMapping/>
+  </p:clrMapOvr>
+  <p:timing>
+    <p:tnLst>
+      <p:par>
+        <p:cTn id="1" dur="indefinite" restart="never" nodeType="tmRoot"/>
+      </p:par>
+    </p:tnLst>
+  </p:timing>
+</p:sld>
+</file>
+
 <file path=ppt/slides/slide2.xml><?xml version="1.0" encoding="utf-8"?>
 <p:sld xmlns:a="http://schemas.openxmlformats.org/drawingml/2006/main" xmlns:r="http://schemas.openxmlformats.org/officeDocument/2006/relationships" xmlns:p="http://schemas.openxmlformats.org/presentationml/2006/main">
   <p:cSld>
@@ -3574,8 +5114,8 @@
         </p:nvSpPr>
         <p:spPr>
           <a:xfrm>
-            <a:off x="914400" y="319414"/>
-            <a:ext cx="4775666" cy="1477328"/>
+            <a:off x="763930" y="208346"/>
+            <a:ext cx="8699818" cy="1754326"/>
           </a:xfrm>
           <a:prstGeom prst="rect">
             <a:avLst/>
@@ -3593,31 +5133,134 @@
                 <a:latin typeface="Arial" panose="020B0604020202020204" pitchFamily="34" charset="0"/>
                 <a:cs typeface="Arial" panose="020B0604020202020204" pitchFamily="34" charset="0"/>
               </a:rPr>
-              <a:t>If you are following along with our datasets…</a:t>
-            </a:r>
-          </a:p>
-          <a:p>
-            <a:r>
-              <a:rPr lang="en-US" dirty="0" smtClean="0">
-                <a:latin typeface="Arial" panose="020B0604020202020204" pitchFamily="34" charset="0"/>
-                <a:cs typeface="Arial" panose="020B0604020202020204" pitchFamily="34" charset="0"/>
-              </a:rPr>
-              <a:t>We will be using the data from this paper…</a:t>
-            </a:r>
-          </a:p>
-          <a:p>
-            <a:endParaRPr lang="en-US" dirty="0" smtClean="0">
+              <a:t>I am assuming that you have installed…</a:t>
+            </a:r>
+          </a:p>
+          <a:p>
+            <a:endParaRPr lang="en-US" dirty="0">
               <a:latin typeface="Arial" panose="020B0604020202020204" pitchFamily="34" charset="0"/>
               <a:cs typeface="Arial" panose="020B0604020202020204" pitchFamily="34" charset="0"/>
             </a:endParaRPr>
           </a:p>
           <a:p>
-            <a:endParaRPr lang="en-US" dirty="0" smtClean="0">
+            <a:r>
+              <a:rPr lang="en-US" dirty="0" smtClean="0">
+                <a:latin typeface="Arial" panose="020B0604020202020204" pitchFamily="34" charset="0"/>
+                <a:cs typeface="Arial" panose="020B0604020202020204" pitchFamily="34" charset="0"/>
+              </a:rPr>
+              <a:t>	Some version of R	</a:t>
+            </a:r>
+          </a:p>
+          <a:p>
+            <a:r>
+              <a:rPr lang="en-US" dirty="0">
+                <a:latin typeface="Arial" panose="020B0604020202020204" pitchFamily="34" charset="0"/>
+                <a:cs typeface="Arial" panose="020B0604020202020204" pitchFamily="34" charset="0"/>
+              </a:rPr>
+              <a:t>	</a:t>
+            </a:r>
+            <a:r>
+              <a:rPr lang="en-US" dirty="0" smtClean="0">
+                <a:latin typeface="Arial" panose="020B0604020202020204" pitchFamily="34" charset="0"/>
+                <a:cs typeface="Arial" panose="020B0604020202020204" pitchFamily="34" charset="0"/>
+              </a:rPr>
+              <a:t>Some text editor (sublime is a very nice choice, or e-macs or vi or r-studio)</a:t>
+            </a:r>
+          </a:p>
+          <a:p>
+            <a:endParaRPr lang="en-US" dirty="0">
               <a:latin typeface="Arial" panose="020B0604020202020204" pitchFamily="34" charset="0"/>
               <a:cs typeface="Arial" panose="020B0604020202020204" pitchFamily="34" charset="0"/>
             </a:endParaRPr>
           </a:p>
           <a:p>
+            <a:r>
+              <a:rPr lang="en-US" dirty="0" smtClean="0">
+                <a:latin typeface="Arial" panose="020B0604020202020204" pitchFamily="34" charset="0"/>
+                <a:cs typeface="Arial" panose="020B0604020202020204" pitchFamily="34" charset="0"/>
+              </a:rPr>
+              <a:t>	 </a:t>
+            </a:r>
+            <a:endParaRPr lang="en-US" dirty="0">
+              <a:latin typeface="Arial" panose="020B0604020202020204" pitchFamily="34" charset="0"/>
+              <a:cs typeface="Arial" panose="020B0604020202020204" pitchFamily="34" charset="0"/>
+            </a:endParaRPr>
+          </a:p>
+        </p:txBody>
+      </p:sp>
+    </p:spTree>
+    <p:extLst>
+      <p:ext uri="{BB962C8B-B14F-4D97-AF65-F5344CB8AC3E}">
+        <p14:creationId xmlns:p14="http://schemas.microsoft.com/office/powerpoint/2010/main" val="3705469136"/>
+      </p:ext>
+    </p:extLst>
+  </p:cSld>
+  <p:clrMapOvr>
+    <a:masterClrMapping/>
+  </p:clrMapOvr>
+  <p:timing>
+    <p:tnLst>
+      <p:par>
+        <p:cTn id="1" dur="indefinite" restart="never" nodeType="tmRoot"/>
+      </p:par>
+    </p:tnLst>
+  </p:timing>
+</p:sld>
+</file>
+
+<file path=ppt/slides/slide20.xml><?xml version="1.0" encoding="utf-8"?>
+<p:sld xmlns:a="http://schemas.openxmlformats.org/drawingml/2006/main" xmlns:r="http://schemas.openxmlformats.org/officeDocument/2006/relationships" xmlns:p="http://schemas.openxmlformats.org/presentationml/2006/main">
+  <p:cSld>
+    <p:spTree>
+      <p:nvGrpSpPr>
+        <p:cNvPr id="1" name=""/>
+        <p:cNvGrpSpPr/>
+        <p:nvPr/>
+      </p:nvGrpSpPr>
+      <p:grpSpPr>
+        <a:xfrm>
+          <a:off x="0" y="0"/>
+          <a:ext cx="0" cy="0"/>
+          <a:chOff x="0" y="0"/>
+          <a:chExt cx="0" cy="0"/>
+        </a:xfrm>
+      </p:grpSpPr>
+      <p:sp>
+        <p:nvSpPr>
+          <p:cNvPr id="4" name="TextBox 3"/>
+          <p:cNvSpPr txBox="1"/>
+          <p:nvPr/>
+        </p:nvSpPr>
+        <p:spPr>
+          <a:xfrm>
+            <a:off x="792866" y="578734"/>
+            <a:ext cx="4172937" cy="369332"/>
+          </a:xfrm>
+          <a:prstGeom prst="rect">
+            <a:avLst/>
+          </a:prstGeom>
+          <a:noFill/>
+        </p:spPr>
+        <p:txBody>
+          <a:bodyPr wrap="none" rtlCol="0">
+            <a:spAutoFit/>
+          </a:bodyPr>
+          <a:lstStyle/>
+          <a:p>
+            <a:r>
+              <a:rPr lang="en-US" dirty="0" err="1" smtClean="0">
+                <a:latin typeface="Arial" panose="020B0604020202020204" pitchFamily="34" charset="0"/>
+                <a:cs typeface="Arial" panose="020B0604020202020204" pitchFamily="34" charset="0"/>
+              </a:rPr>
+              <a:t>myTNorm</a:t>
+            </a:r>
+            <a:r>
+              <a:rPr lang="en-US" dirty="0" smtClean="0">
+                <a:latin typeface="Arial" panose="020B0604020202020204" pitchFamily="34" charset="0"/>
+                <a:cs typeface="Arial" panose="020B0604020202020204" pitchFamily="34" charset="0"/>
+              </a:rPr>
+              <a:t> is now in relative abundance</a:t>
+            </a:r>
             <a:endParaRPr lang="en-US" dirty="0">
               <a:latin typeface="Arial" panose="020B0604020202020204" pitchFamily="34" charset="0"/>
               <a:cs typeface="Arial" panose="020B0604020202020204" pitchFamily="34" charset="0"/>
@@ -3641,46 +5284,506 @@
         </p:blipFill>
         <p:spPr>
           <a:xfrm>
-            <a:off x="914400" y="1216538"/>
-            <a:ext cx="10137562" cy="4620122"/>
+            <a:off x="989086" y="1390810"/>
+            <a:ext cx="7953434" cy="4645718"/>
           </a:xfrm>
           <a:prstGeom prst="rect">
             <a:avLst/>
           </a:prstGeom>
         </p:spPr>
       </p:pic>
-      <p:sp>
-        <p:nvSpPr>
-          <p:cNvPr id="6" name="Rectangle 5"/>
-          <p:cNvSpPr/>
+    </p:spTree>
+    <p:extLst>
+      <p:ext uri="{BB962C8B-B14F-4D97-AF65-F5344CB8AC3E}">
+        <p14:creationId xmlns:p14="http://schemas.microsoft.com/office/powerpoint/2010/main" val="2680610171"/>
+      </p:ext>
+    </p:extLst>
+  </p:cSld>
+  <p:clrMapOvr>
+    <a:masterClrMapping/>
+  </p:clrMapOvr>
+  <p:timing>
+    <p:tnLst>
+      <p:par>
+        <p:cTn id="1" dur="indefinite" restart="never" nodeType="tmRoot"/>
+      </p:par>
+    </p:tnLst>
+  </p:timing>
+</p:sld>
+</file>
+
+<file path=ppt/slides/slide21.xml><?xml version="1.0" encoding="utf-8"?>
+<p:sld xmlns:a="http://schemas.openxmlformats.org/drawingml/2006/main" xmlns:r="http://schemas.openxmlformats.org/officeDocument/2006/relationships" xmlns:p="http://schemas.openxmlformats.org/presentationml/2006/main">
+  <p:cSld>
+    <p:spTree>
+      <p:nvGrpSpPr>
+        <p:cNvPr id="1" name=""/>
+        <p:cNvGrpSpPr/>
+        <p:nvPr/>
+      </p:nvGrpSpPr>
+      <p:grpSpPr>
+        <a:xfrm>
+          <a:off x="0" y="0"/>
+          <a:ext cx="0" cy="0"/>
+          <a:chOff x="0" y="0"/>
+          <a:chExt cx="0" cy="0"/>
+        </a:xfrm>
+      </p:grpSpPr>
+      <p:sp>
+        <p:nvSpPr>
+          <p:cNvPr id="4" name="TextBox 3"/>
+          <p:cNvSpPr txBox="1"/>
           <p:nvPr/>
         </p:nvSpPr>
         <p:spPr>
           <a:xfrm>
-            <a:off x="3617935" y="6112505"/>
-            <a:ext cx="8920618" cy="369332"/>
+            <a:off x="416690" y="190984"/>
+            <a:ext cx="7413120" cy="923330"/>
           </a:xfrm>
           <a:prstGeom prst="rect">
             <a:avLst/>
           </a:prstGeom>
-        </p:spPr>
-        <p:txBody>
-          <a:bodyPr wrap="square">
+          <a:noFill/>
+        </p:spPr>
+        <p:txBody>
+          <a:bodyPr wrap="none" rtlCol="0">
             <a:spAutoFit/>
           </a:bodyPr>
           <a:lstStyle/>
           <a:p>
             <a:r>
-              <a:rPr lang="en-US"/>
-              <a:t>https://microbiomejournal.biomedcentral.com/articles/10.1186/s40168-017-0338-7</a:t>
-            </a:r>
+              <a:rPr lang="en-US" dirty="0" smtClean="0">
+                <a:latin typeface="Arial" panose="020B0604020202020204" pitchFamily="34" charset="0"/>
+                <a:cs typeface="Arial" panose="020B0604020202020204" pitchFamily="34" charset="0"/>
+              </a:rPr>
+              <a:t>Finally, we want to be able to write our normalized file to an output file. </a:t>
+            </a:r>
+          </a:p>
+          <a:p>
+            <a:r>
+              <a:rPr lang="en-US" dirty="0" smtClean="0">
+                <a:latin typeface="Arial" panose="020B0604020202020204" pitchFamily="34" charset="0"/>
+                <a:cs typeface="Arial" panose="020B0604020202020204" pitchFamily="34" charset="0"/>
+              </a:rPr>
+              <a:t>This is a little more involved than it seems like it should be </a:t>
+            </a:r>
+          </a:p>
+          <a:p>
+            <a:r>
+              <a:rPr lang="en-US" dirty="0" smtClean="0">
+                <a:latin typeface="Arial" panose="020B0604020202020204" pitchFamily="34" charset="0"/>
+                <a:cs typeface="Arial" panose="020B0604020202020204" pitchFamily="34" charset="0"/>
+              </a:rPr>
+              <a:t>(learning R is mostly learning stupid R tricks…)</a:t>
+            </a:r>
+            <a:endParaRPr lang="en-US" dirty="0">
+              <a:latin typeface="Arial" panose="020B0604020202020204" pitchFamily="34" charset="0"/>
+              <a:cs typeface="Arial" panose="020B0604020202020204" pitchFamily="34" charset="0"/>
+            </a:endParaRPr>
+          </a:p>
+        </p:txBody>
+      </p:sp>
+      <p:pic>
+        <p:nvPicPr>
+          <p:cNvPr id="5" name="Picture 4"/>
+          <p:cNvPicPr>
+            <a:picLocks noChangeAspect="1"/>
+          </p:cNvPicPr>
+          <p:nvPr/>
+        </p:nvPicPr>
+        <p:blipFill>
+          <a:blip r:embed="rId2"/>
+          <a:stretch>
+            <a:fillRect/>
+          </a:stretch>
+        </p:blipFill>
+        <p:spPr>
+          <a:xfrm>
+            <a:off x="208647" y="1062640"/>
+            <a:ext cx="10310260" cy="5419183"/>
+          </a:xfrm>
+          <a:prstGeom prst="rect">
+            <a:avLst/>
+          </a:prstGeom>
+        </p:spPr>
+      </p:pic>
+      <p:cxnSp>
+        <p:nvCxnSpPr>
+          <p:cNvPr id="7" name="Straight Arrow Connector 6"/>
+          <p:cNvCxnSpPr/>
+          <p:nvPr/>
+        </p:nvCxnSpPr>
+        <p:spPr>
+          <a:xfrm flipH="1">
+            <a:off x="5688957" y="4797706"/>
+            <a:ext cx="839165" cy="306729"/>
+          </a:xfrm>
+          <a:prstGeom prst="straightConnector1">
+            <a:avLst/>
+          </a:prstGeom>
+          <a:ln>
+            <a:tailEnd type="triangle"/>
+          </a:ln>
+        </p:spPr>
+        <p:style>
+          <a:lnRef idx="1">
+            <a:schemeClr val="accent1"/>
+          </a:lnRef>
+          <a:fillRef idx="0">
+            <a:schemeClr val="accent1"/>
+          </a:fillRef>
+          <a:effectRef idx="0">
+            <a:schemeClr val="accent1"/>
+          </a:effectRef>
+          <a:fontRef idx="minor">
+            <a:schemeClr val="tx1"/>
+          </a:fontRef>
+        </p:style>
+      </p:cxnSp>
+      <p:cxnSp>
+        <p:nvCxnSpPr>
+          <p:cNvPr id="9" name="Straight Arrow Connector 8"/>
+          <p:cNvCxnSpPr/>
+          <p:nvPr/>
+        </p:nvCxnSpPr>
+        <p:spPr>
+          <a:xfrm flipH="1">
+            <a:off x="5804704" y="5532699"/>
+            <a:ext cx="474562" cy="509286"/>
+          </a:xfrm>
+          <a:prstGeom prst="straightConnector1">
+            <a:avLst/>
+          </a:prstGeom>
+          <a:ln>
+            <a:tailEnd type="triangle"/>
+          </a:ln>
+        </p:spPr>
+        <p:style>
+          <a:lnRef idx="1">
+            <a:schemeClr val="accent1"/>
+          </a:lnRef>
+          <a:fillRef idx="0">
+            <a:schemeClr val="accent1"/>
+          </a:fillRef>
+          <a:effectRef idx="0">
+            <a:schemeClr val="accent1"/>
+          </a:effectRef>
+          <a:fontRef idx="minor">
+            <a:schemeClr val="tx1"/>
+          </a:fontRef>
+        </p:style>
+      </p:cxnSp>
+      <p:sp>
+        <p:nvSpPr>
+          <p:cNvPr id="10" name="TextBox 9"/>
+          <p:cNvSpPr txBox="1"/>
+          <p:nvPr/>
+        </p:nvSpPr>
+        <p:spPr>
+          <a:xfrm>
+            <a:off x="6528124" y="4664598"/>
+            <a:ext cx="4467890" cy="923330"/>
+          </a:xfrm>
+          <a:prstGeom prst="rect">
+            <a:avLst/>
+          </a:prstGeom>
+          <a:noFill/>
+        </p:spPr>
+        <p:txBody>
+          <a:bodyPr wrap="none" rtlCol="0">
+            <a:spAutoFit/>
+          </a:bodyPr>
+          <a:lstStyle/>
+          <a:p>
+            <a:r>
+              <a:rPr lang="en-US" dirty="0" smtClean="0">
+                <a:latin typeface="Arial" panose="020B0604020202020204" pitchFamily="34" charset="0"/>
+                <a:cs typeface="Arial" panose="020B0604020202020204" pitchFamily="34" charset="0"/>
+              </a:rPr>
+              <a:t>R by default will not give the </a:t>
+            </a:r>
+            <a:r>
+              <a:rPr lang="en-US" dirty="0" err="1" smtClean="0">
+                <a:latin typeface="Arial" panose="020B0604020202020204" pitchFamily="34" charset="0"/>
+                <a:cs typeface="Arial" panose="020B0604020202020204" pitchFamily="34" charset="0"/>
+              </a:rPr>
+              <a:t>sampleIDs</a:t>
+            </a:r>
+            <a:r>
+              <a:rPr lang="en-US" dirty="0" smtClean="0">
+                <a:latin typeface="Arial" panose="020B0604020202020204" pitchFamily="34" charset="0"/>
+                <a:cs typeface="Arial" panose="020B0604020202020204" pitchFamily="34" charset="0"/>
+              </a:rPr>
+              <a:t> a </a:t>
+            </a:r>
+          </a:p>
+          <a:p>
+            <a:r>
+              <a:rPr lang="en-US" dirty="0" smtClean="0">
+                <a:latin typeface="Arial" panose="020B0604020202020204" pitchFamily="34" charset="0"/>
+                <a:cs typeface="Arial" panose="020B0604020202020204" pitchFamily="34" charset="0"/>
+              </a:rPr>
+              <a:t>column header.</a:t>
+            </a:r>
+          </a:p>
+          <a:p>
+            <a:r>
+              <a:rPr lang="en-US" dirty="0" smtClean="0">
+                <a:latin typeface="Arial" panose="020B0604020202020204" pitchFamily="34" charset="0"/>
+                <a:cs typeface="Arial" panose="020B0604020202020204" pitchFamily="34" charset="0"/>
+              </a:rPr>
+              <a:t>This hacks around that default behavior</a:t>
+            </a:r>
+            <a:endParaRPr lang="en-US" dirty="0">
+              <a:latin typeface="Arial" panose="020B0604020202020204" pitchFamily="34" charset="0"/>
+              <a:cs typeface="Arial" panose="020B0604020202020204" pitchFamily="34" charset="0"/>
+            </a:endParaRPr>
           </a:p>
         </p:txBody>
       </p:sp>
     </p:spTree>
     <p:extLst>
       <p:ext uri="{BB962C8B-B14F-4D97-AF65-F5344CB8AC3E}">
-        <p14:creationId xmlns:p14="http://schemas.microsoft.com/office/powerpoint/2010/main" val="3696721597"/>
+        <p14:creationId xmlns:p14="http://schemas.microsoft.com/office/powerpoint/2010/main" val="3150779716"/>
+      </p:ext>
+    </p:extLst>
+  </p:cSld>
+  <p:clrMapOvr>
+    <a:masterClrMapping/>
+  </p:clrMapOvr>
+  <p:timing>
+    <p:tnLst>
+      <p:par>
+        <p:cTn id="1" dur="indefinite" restart="never" nodeType="tmRoot"/>
+      </p:par>
+    </p:tnLst>
+  </p:timing>
+</p:sld>
+</file>
+
+<file path=ppt/slides/slide22.xml><?xml version="1.0" encoding="utf-8"?>
+<p:sld xmlns:a="http://schemas.openxmlformats.org/drawingml/2006/main" xmlns:r="http://schemas.openxmlformats.org/officeDocument/2006/relationships" xmlns:p="http://schemas.openxmlformats.org/presentationml/2006/main">
+  <p:cSld>
+    <p:spTree>
+      <p:nvGrpSpPr>
+        <p:cNvPr id="1" name=""/>
+        <p:cNvGrpSpPr/>
+        <p:nvPr/>
+      </p:nvGrpSpPr>
+      <p:grpSpPr>
+        <a:xfrm>
+          <a:off x="0" y="0"/>
+          <a:ext cx="0" cy="0"/>
+          <a:chOff x="0" y="0"/>
+          <a:chExt cx="0" cy="0"/>
+        </a:xfrm>
+      </p:grpSpPr>
+      <p:sp>
+        <p:nvSpPr>
+          <p:cNvPr id="4" name="TextBox 3"/>
+          <p:cNvSpPr txBox="1"/>
+          <p:nvPr/>
+        </p:nvSpPr>
+        <p:spPr>
+          <a:xfrm>
+            <a:off x="972273" y="81024"/>
+            <a:ext cx="9939580" cy="369332"/>
+          </a:xfrm>
+          <a:prstGeom prst="rect">
+            <a:avLst/>
+          </a:prstGeom>
+          <a:noFill/>
+        </p:spPr>
+        <p:txBody>
+          <a:bodyPr wrap="none" rtlCol="0">
+            <a:spAutoFit/>
+          </a:bodyPr>
+          <a:lstStyle/>
+          <a:p>
+            <a:r>
+              <a:rPr lang="en-US" dirty="0" smtClean="0">
+                <a:latin typeface="Arial" panose="020B0604020202020204" pitchFamily="34" charset="0"/>
+                <a:cs typeface="Arial" panose="020B0604020202020204" pitchFamily="34" charset="0"/>
+              </a:rPr>
+              <a:t>We end up with a text file in our working directory that can be imported into Excel (or wherever) </a:t>
+            </a:r>
+            <a:endParaRPr lang="en-US" dirty="0">
+              <a:latin typeface="Arial" panose="020B0604020202020204" pitchFamily="34" charset="0"/>
+              <a:cs typeface="Arial" panose="020B0604020202020204" pitchFamily="34" charset="0"/>
+            </a:endParaRPr>
+          </a:p>
+        </p:txBody>
+      </p:sp>
+      <p:pic>
+        <p:nvPicPr>
+          <p:cNvPr id="5" name="Picture 4"/>
+          <p:cNvPicPr>
+            <a:picLocks noChangeAspect="1"/>
+          </p:cNvPicPr>
+          <p:nvPr/>
+        </p:nvPicPr>
+        <p:blipFill>
+          <a:blip r:embed="rId2"/>
+          <a:stretch>
+            <a:fillRect/>
+          </a:stretch>
+        </p:blipFill>
+        <p:spPr>
+          <a:xfrm>
+            <a:off x="214131" y="822275"/>
+            <a:ext cx="10970350" cy="5393330"/>
+          </a:xfrm>
+          <a:prstGeom prst="rect">
+            <a:avLst/>
+          </a:prstGeom>
+        </p:spPr>
+      </p:pic>
+    </p:spTree>
+    <p:extLst>
+      <p:ext uri="{BB962C8B-B14F-4D97-AF65-F5344CB8AC3E}">
+        <p14:creationId xmlns:p14="http://schemas.microsoft.com/office/powerpoint/2010/main" val="878226914"/>
+      </p:ext>
+    </p:extLst>
+  </p:cSld>
+  <p:clrMapOvr>
+    <a:masterClrMapping/>
+  </p:clrMapOvr>
+  <p:timing>
+    <p:tnLst>
+      <p:par>
+        <p:cTn id="1" dur="indefinite" restart="never" nodeType="tmRoot"/>
+      </p:par>
+    </p:tnLst>
+  </p:timing>
+</p:sld>
+</file>
+
+<file path=ppt/slides/slide23.xml><?xml version="1.0" encoding="utf-8"?>
+<p:sld xmlns:a="http://schemas.openxmlformats.org/drawingml/2006/main" xmlns:r="http://schemas.openxmlformats.org/officeDocument/2006/relationships" xmlns:p="http://schemas.openxmlformats.org/presentationml/2006/main">
+  <p:cSld>
+    <p:spTree>
+      <p:nvGrpSpPr>
+        <p:cNvPr id="1" name=""/>
+        <p:cNvGrpSpPr/>
+        <p:nvPr/>
+      </p:nvGrpSpPr>
+      <p:grpSpPr>
+        <a:xfrm>
+          <a:off x="0" y="0"/>
+          <a:ext cx="0" cy="0"/>
+          <a:chOff x="0" y="0"/>
+          <a:chExt cx="0" cy="0"/>
+        </a:xfrm>
+      </p:grpSpPr>
+      <p:sp>
+        <p:nvSpPr>
+          <p:cNvPr id="4" name="TextBox 3"/>
+          <p:cNvSpPr txBox="1"/>
+          <p:nvPr/>
+        </p:nvSpPr>
+        <p:spPr>
+          <a:xfrm>
+            <a:off x="810228" y="665544"/>
+            <a:ext cx="4467890" cy="1477328"/>
+          </a:xfrm>
+          <a:prstGeom prst="rect">
+            <a:avLst/>
+          </a:prstGeom>
+          <a:noFill/>
+        </p:spPr>
+        <p:txBody>
+          <a:bodyPr wrap="none" rtlCol="0">
+            <a:spAutoFit/>
+          </a:bodyPr>
+          <a:lstStyle/>
+          <a:p>
+            <a:r>
+              <a:rPr lang="en-US" dirty="0" smtClean="0">
+                <a:latin typeface="Arial" panose="020B0604020202020204" pitchFamily="34" charset="0"/>
+                <a:cs typeface="Arial" panose="020B0604020202020204" pitchFamily="34" charset="0"/>
+              </a:rPr>
+              <a:t>Normalizing your data</a:t>
+            </a:r>
+          </a:p>
+          <a:p>
+            <a:r>
+              <a:rPr lang="en-US" dirty="0" smtClean="0">
+                <a:latin typeface="Arial" panose="020B0604020202020204" pitchFamily="34" charset="0"/>
+                <a:cs typeface="Arial" panose="020B0604020202020204" pitchFamily="34" charset="0"/>
+              </a:rPr>
+              <a:t>PCA Ordination</a:t>
+            </a:r>
+          </a:p>
+          <a:p>
+            <a:r>
+              <a:rPr lang="en-US" dirty="0" smtClean="0">
+                <a:latin typeface="Arial" panose="020B0604020202020204" pitchFamily="34" charset="0"/>
+                <a:cs typeface="Arial" panose="020B0604020202020204" pitchFamily="34" charset="0"/>
+              </a:rPr>
+              <a:t>Graphing everything into one big PDF ball</a:t>
+            </a:r>
+          </a:p>
+          <a:p>
+            <a:r>
+              <a:rPr lang="en-US" dirty="0" smtClean="0">
+                <a:latin typeface="Arial" panose="020B0604020202020204" pitchFamily="34" charset="0"/>
+                <a:cs typeface="Arial" panose="020B0604020202020204" pitchFamily="34" charset="0"/>
+              </a:rPr>
+              <a:t>Some Simple Statistical Models</a:t>
+            </a:r>
+          </a:p>
+          <a:p>
+            <a:r>
+              <a:rPr lang="en-US" dirty="0" smtClean="0">
+                <a:latin typeface="Arial" panose="020B0604020202020204" pitchFamily="34" charset="0"/>
+                <a:cs typeface="Arial" panose="020B0604020202020204" pitchFamily="34" charset="0"/>
+              </a:rPr>
+              <a:t>Some Not So Simple Statistical Models</a:t>
+            </a:r>
+            <a:endParaRPr lang="en-US" dirty="0">
+              <a:latin typeface="Arial" panose="020B0604020202020204" pitchFamily="34" charset="0"/>
+              <a:cs typeface="Arial" panose="020B0604020202020204" pitchFamily="34" charset="0"/>
+            </a:endParaRPr>
+          </a:p>
+        </p:txBody>
+      </p:sp>
+      <p:cxnSp>
+        <p:nvCxnSpPr>
+          <p:cNvPr id="5" name="Straight Arrow Connector 4"/>
+          <p:cNvCxnSpPr/>
+          <p:nvPr/>
+        </p:nvCxnSpPr>
+        <p:spPr>
+          <a:xfrm flipH="1">
+            <a:off x="2604304" y="1099588"/>
+            <a:ext cx="1209555" cy="0"/>
+          </a:xfrm>
+          <a:prstGeom prst="straightConnector1">
+            <a:avLst/>
+          </a:prstGeom>
+          <a:ln>
+            <a:tailEnd type="triangle"/>
+          </a:ln>
+        </p:spPr>
+        <p:style>
+          <a:lnRef idx="1">
+            <a:schemeClr val="accent1"/>
+          </a:lnRef>
+          <a:fillRef idx="0">
+            <a:schemeClr val="accent1"/>
+          </a:fillRef>
+          <a:effectRef idx="0">
+            <a:schemeClr val="accent1"/>
+          </a:effectRef>
+          <a:fontRef idx="minor">
+            <a:schemeClr val="tx1"/>
+          </a:fontRef>
+        </p:style>
+      </p:cxnSp>
+    </p:spTree>
+    <p:extLst>
+      <p:ext uri="{BB962C8B-B14F-4D97-AF65-F5344CB8AC3E}">
+        <p14:creationId xmlns:p14="http://schemas.microsoft.com/office/powerpoint/2010/main" val="1755656137"/>
       </p:ext>
     </p:extLst>
   </p:cSld>
@@ -3716,14 +5819,14 @@
       </p:grpSpPr>
       <p:sp>
         <p:nvSpPr>
-          <p:cNvPr id="5" name="TextBox 4"/>
+          <p:cNvPr id="4" name="TextBox 3"/>
           <p:cNvSpPr txBox="1"/>
           <p:nvPr/>
         </p:nvSpPr>
         <p:spPr>
           <a:xfrm>
-            <a:off x="670142" y="306888"/>
-            <a:ext cx="9328323" cy="369332"/>
+            <a:off x="810228" y="665544"/>
+            <a:ext cx="4467890" cy="1477328"/>
           </a:xfrm>
           <a:prstGeom prst="rect">
             <a:avLst/>
@@ -3741,21 +5844,43 @@
                 <a:latin typeface="Arial" panose="020B0604020202020204" pitchFamily="34" charset="0"/>
                 <a:cs typeface="Arial" panose="020B0604020202020204" pitchFamily="34" charset="0"/>
               </a:rPr>
-              <a:t>Tables and r-scripts were nicely organized by Kathryn </a:t>
-            </a:r>
-            <a:r>
-              <a:rPr lang="en-US" dirty="0" err="1" smtClean="0">
-                <a:latin typeface="Arial" panose="020B0604020202020204" pitchFamily="34" charset="0"/>
-                <a:cs typeface="Arial" panose="020B0604020202020204" pitchFamily="34" charset="0"/>
-              </a:rPr>
-              <a:t>Winglee</a:t>
-            </a:r>
-            <a:r>
-              <a:rPr lang="en-US" dirty="0" smtClean="0">
-                <a:latin typeface="Arial" panose="020B0604020202020204" pitchFamily="34" charset="0"/>
-                <a:cs typeface="Arial" panose="020B0604020202020204" pitchFamily="34" charset="0"/>
-              </a:rPr>
-              <a:t> (now of the CDC in Atlanta)</a:t>
+              <a:t>Normalizing your data</a:t>
+            </a:r>
+          </a:p>
+          <a:p>
+            <a:r>
+              <a:rPr lang="en-US" dirty="0" smtClean="0">
+                <a:latin typeface="Arial" panose="020B0604020202020204" pitchFamily="34" charset="0"/>
+                <a:cs typeface="Arial" panose="020B0604020202020204" pitchFamily="34" charset="0"/>
+              </a:rPr>
+              <a:t>PCA Ordination</a:t>
+            </a:r>
+          </a:p>
+          <a:p>
+            <a:r>
+              <a:rPr lang="en-US" dirty="0" smtClean="0">
+                <a:latin typeface="Arial" panose="020B0604020202020204" pitchFamily="34" charset="0"/>
+                <a:cs typeface="Arial" panose="020B0604020202020204" pitchFamily="34" charset="0"/>
+              </a:rPr>
+              <a:t>Graphing everything into one big PDF ball</a:t>
+            </a:r>
+          </a:p>
+          <a:p>
+            <a:r>
+              <a:rPr lang="en-US" dirty="0" smtClean="0">
+                <a:latin typeface="Arial" panose="020B0604020202020204" pitchFamily="34" charset="0"/>
+                <a:cs typeface="Arial" panose="020B0604020202020204" pitchFamily="34" charset="0"/>
+              </a:rPr>
+              <a:t>Some Simple Statistical Models</a:t>
+            </a:r>
+          </a:p>
+          <a:p>
+            <a:r>
+              <a:rPr lang="en-US" dirty="0" smtClean="0">
+                <a:latin typeface="Arial" panose="020B0604020202020204" pitchFamily="34" charset="0"/>
+                <a:cs typeface="Arial" panose="020B0604020202020204" pitchFamily="34" charset="0"/>
+              </a:rPr>
+              <a:t>Some Not So Simple Statistical Models</a:t>
             </a:r>
             <a:endParaRPr lang="en-US" dirty="0">
               <a:latin typeface="Arial" panose="020B0604020202020204" pitchFamily="34" charset="0"/>
@@ -3764,103 +5889,10 @@
           </a:p>
         </p:txBody>
       </p:sp>
-      <p:sp>
-        <p:nvSpPr>
-          <p:cNvPr id="6" name="Rectangle 5"/>
-          <p:cNvSpPr/>
-          <p:nvPr/>
-        </p:nvSpPr>
-        <p:spPr>
-          <a:xfrm>
-            <a:off x="7475050" y="6263107"/>
-            <a:ext cx="4582152" cy="369332"/>
-          </a:xfrm>
-          <a:prstGeom prst="rect">
-            <a:avLst/>
-          </a:prstGeom>
-        </p:spPr>
-        <p:txBody>
-          <a:bodyPr wrap="none">
-            <a:spAutoFit/>
-          </a:bodyPr>
-          <a:lstStyle/>
-          <a:p>
-            <a:r>
-              <a:rPr lang="en-US" dirty="0"/>
-              <a:t>https://github.com/kwinglee/UrbanRuralChina</a:t>
-            </a:r>
-          </a:p>
-        </p:txBody>
-      </p:sp>
-      <p:pic>
-        <p:nvPicPr>
-          <p:cNvPr id="7" name="Picture 6"/>
-          <p:cNvPicPr>
-            <a:picLocks noChangeAspect="1"/>
-          </p:cNvPicPr>
-          <p:nvPr/>
-        </p:nvPicPr>
-        <p:blipFill>
-          <a:blip r:embed="rId2"/>
-          <a:stretch>
-            <a:fillRect/>
-          </a:stretch>
-        </p:blipFill>
-        <p:spPr>
-          <a:xfrm>
-            <a:off x="551234" y="1320892"/>
-            <a:ext cx="11264123" cy="2523269"/>
-          </a:xfrm>
-          <a:prstGeom prst="rect">
-            <a:avLst/>
-          </a:prstGeom>
-        </p:spPr>
-      </p:pic>
-      <p:pic>
-        <p:nvPicPr>
-          <p:cNvPr id="1026" name="Picture 2" descr="Winglee, Kathryn"/>
-          <p:cNvPicPr>
-            <a:picLocks noChangeAspect="1" noChangeArrowheads="1"/>
-          </p:cNvPicPr>
-          <p:nvPr/>
-        </p:nvPicPr>
-        <p:blipFill>
-          <a:blip r:embed="rId3">
-            <a:extLst>
-              <a:ext uri="{28A0092B-C50C-407E-A947-70E740481C1C}">
-                <a14:useLocalDpi xmlns:a14="http://schemas.microsoft.com/office/drawing/2010/main" val="0"/>
-              </a:ext>
-            </a:extLst>
-          </a:blip>
-          <a:srcRect/>
-          <a:stretch>
-            <a:fillRect/>
-          </a:stretch>
-        </p:blipFill>
-        <p:spPr bwMode="auto">
-          <a:xfrm>
-            <a:off x="670142" y="4543512"/>
-            <a:ext cx="2095500" cy="1962150"/>
-          </a:xfrm>
-          <a:prstGeom prst="rect">
-            <a:avLst/>
-          </a:prstGeom>
-          <a:noFill/>
-          <a:extLst>
-            <a:ext uri="{909E8E84-426E-40DD-AFC4-6F175D3DCCD1}">
-              <a14:hiddenFill xmlns:a14="http://schemas.microsoft.com/office/drawing/2010/main">
-                <a:solidFill>
-                  <a:srgbClr val="FFFFFF"/>
-                </a:solidFill>
-              </a14:hiddenFill>
-            </a:ext>
-          </a:extLst>
-        </p:spPr>
-      </p:pic>
     </p:spTree>
     <p:extLst>
       <p:ext uri="{BB962C8B-B14F-4D97-AF65-F5344CB8AC3E}">
-        <p14:creationId xmlns:p14="http://schemas.microsoft.com/office/powerpoint/2010/main" val="1962320976"/>
+        <p14:creationId xmlns:p14="http://schemas.microsoft.com/office/powerpoint/2010/main" val="1768941785"/>
       </p:ext>
     </p:extLst>
   </p:cSld>
@@ -3902,8 +5934,8 @@
         </p:nvSpPr>
         <p:spPr>
           <a:xfrm>
-            <a:off x="507304" y="400833"/>
-            <a:ext cx="5797421" cy="369332"/>
+            <a:off x="914400" y="319414"/>
+            <a:ext cx="4775666" cy="1477328"/>
           </a:xfrm>
           <a:prstGeom prst="rect">
             <a:avLst/>
@@ -3921,40 +5953,35 @@
                 <a:latin typeface="Arial" panose="020B0604020202020204" pitchFamily="34" charset="0"/>
                 <a:cs typeface="Arial" panose="020B0604020202020204" pitchFamily="34" charset="0"/>
               </a:rPr>
-              <a:t>We will use this spreadsheet as our base input into R…</a:t>
-            </a:r>
+              <a:t>If you are following along with our datasets…</a:t>
+            </a:r>
+          </a:p>
+          <a:p>
+            <a:r>
+              <a:rPr lang="en-US" dirty="0" smtClean="0">
+                <a:latin typeface="Arial" panose="020B0604020202020204" pitchFamily="34" charset="0"/>
+                <a:cs typeface="Arial" panose="020B0604020202020204" pitchFamily="34" charset="0"/>
+              </a:rPr>
+              <a:t>We will be using the data from this paper…</a:t>
+            </a:r>
+          </a:p>
+          <a:p>
+            <a:endParaRPr lang="en-US" dirty="0" smtClean="0">
+              <a:latin typeface="Arial" panose="020B0604020202020204" pitchFamily="34" charset="0"/>
+              <a:cs typeface="Arial" panose="020B0604020202020204" pitchFamily="34" charset="0"/>
+            </a:endParaRPr>
+          </a:p>
+          <a:p>
+            <a:endParaRPr lang="en-US" dirty="0" smtClean="0">
+              <a:latin typeface="Arial" panose="020B0604020202020204" pitchFamily="34" charset="0"/>
+              <a:cs typeface="Arial" panose="020B0604020202020204" pitchFamily="34" charset="0"/>
+            </a:endParaRPr>
+          </a:p>
+          <a:p>
             <a:endParaRPr lang="en-US" dirty="0">
               <a:latin typeface="Arial" panose="020B0604020202020204" pitchFamily="34" charset="0"/>
               <a:cs typeface="Arial" panose="020B0604020202020204" pitchFamily="34" charset="0"/>
             </a:endParaRPr>
-          </a:p>
-        </p:txBody>
-      </p:sp>
-      <p:sp>
-        <p:nvSpPr>
-          <p:cNvPr id="2" name="Rectangle 1"/>
-          <p:cNvSpPr/>
-          <p:nvPr/>
-        </p:nvSpPr>
-        <p:spPr>
-          <a:xfrm>
-            <a:off x="148224" y="6418255"/>
-            <a:ext cx="13536461" cy="338554"/>
-          </a:xfrm>
-          <a:prstGeom prst="rect">
-            <a:avLst/>
-          </a:prstGeom>
-        </p:spPr>
-        <p:txBody>
-          <a:bodyPr wrap="square">
-            <a:spAutoFit/>
-          </a:bodyPr>
-          <a:lstStyle/>
-          <a:p>
-            <a:r>
-              <a:rPr lang="en-US" sz="1600" dirty="0"/>
-              <a:t>https://github.com/kwinglee/UrbanRuralChina/blob/master/16SrRNA/inputData/RDP/genus_taxaAsColumnsLogNorm_WithMetadata.txt</a:t>
-            </a:r>
           </a:p>
         </p:txBody>
       </p:sp>
@@ -3967,25 +5994,53 @@
           <p:nvPr/>
         </p:nvPicPr>
         <p:blipFill>
-          <a:blip r:embed="rId3"/>
+          <a:blip r:embed="rId2"/>
           <a:stretch>
             <a:fillRect/>
           </a:stretch>
         </p:blipFill>
         <p:spPr>
           <a:xfrm>
-            <a:off x="344466" y="945385"/>
-            <a:ext cx="11360458" cy="3325989"/>
+            <a:off x="914400" y="1216538"/>
+            <a:ext cx="10137562" cy="4620122"/>
           </a:xfrm>
           <a:prstGeom prst="rect">
             <a:avLst/>
           </a:prstGeom>
         </p:spPr>
       </p:pic>
+      <p:sp>
+        <p:nvSpPr>
+          <p:cNvPr id="6" name="Rectangle 5"/>
+          <p:cNvSpPr/>
+          <p:nvPr/>
+        </p:nvSpPr>
+        <p:spPr>
+          <a:xfrm>
+            <a:off x="3617935" y="6112505"/>
+            <a:ext cx="8920618" cy="369332"/>
+          </a:xfrm>
+          <a:prstGeom prst="rect">
+            <a:avLst/>
+          </a:prstGeom>
+        </p:spPr>
+        <p:txBody>
+          <a:bodyPr wrap="square">
+            <a:spAutoFit/>
+          </a:bodyPr>
+          <a:lstStyle/>
+          <a:p>
+            <a:r>
+              <a:rPr lang="en-US"/>
+              <a:t>https://microbiomejournal.biomedcentral.com/articles/10.1186/s40168-017-0338-7</a:t>
+            </a:r>
+          </a:p>
+        </p:txBody>
+      </p:sp>
     </p:spTree>
     <p:extLst>
       <p:ext uri="{BB962C8B-B14F-4D97-AF65-F5344CB8AC3E}">
-        <p14:creationId xmlns:p14="http://schemas.microsoft.com/office/powerpoint/2010/main" val="1514337921"/>
+        <p14:creationId xmlns:p14="http://schemas.microsoft.com/office/powerpoint/2010/main" val="3696721597"/>
       </p:ext>
     </p:extLst>
   </p:cSld>
@@ -4021,14 +6076,14 @@
       </p:grpSpPr>
       <p:sp>
         <p:nvSpPr>
-          <p:cNvPr id="4" name="TextBox 3"/>
+          <p:cNvPr id="5" name="TextBox 4"/>
           <p:cNvSpPr txBox="1"/>
           <p:nvPr/>
         </p:nvSpPr>
         <p:spPr>
           <a:xfrm>
-            <a:off x="544882" y="444674"/>
-            <a:ext cx="10982494" cy="1477328"/>
+            <a:off x="670142" y="306888"/>
+            <a:ext cx="9328323" cy="369332"/>
           </a:xfrm>
           <a:prstGeom prst="rect">
             <a:avLst/>
@@ -4046,79 +6101,60 @@
                 <a:latin typeface="Arial" panose="020B0604020202020204" pitchFamily="34" charset="0"/>
                 <a:cs typeface="Arial" panose="020B0604020202020204" pitchFamily="34" charset="0"/>
               </a:rPr>
-              <a:t>This spreadsheet has the following features:</a:t>
-            </a:r>
-          </a:p>
-          <a:p>
+              <a:t>Tables and r-scripts were nicely organized by Kathryn </a:t>
+            </a:r>
+            <a:r>
+              <a:rPr lang="en-US" dirty="0" err="1" smtClean="0">
+                <a:latin typeface="Arial" panose="020B0604020202020204" pitchFamily="34" charset="0"/>
+                <a:cs typeface="Arial" panose="020B0604020202020204" pitchFamily="34" charset="0"/>
+              </a:rPr>
+              <a:t>Winglee</a:t>
+            </a:r>
+            <a:r>
+              <a:rPr lang="en-US" dirty="0" smtClean="0">
+                <a:latin typeface="Arial" panose="020B0604020202020204" pitchFamily="34" charset="0"/>
+                <a:cs typeface="Arial" panose="020B0604020202020204" pitchFamily="34" charset="0"/>
+              </a:rPr>
+              <a:t> (now of the CDC in Atlanta)</a:t>
+            </a:r>
             <a:endParaRPr lang="en-US" dirty="0">
               <a:latin typeface="Arial" panose="020B0604020202020204" pitchFamily="34" charset="0"/>
               <a:cs typeface="Arial" panose="020B0604020202020204" pitchFamily="34" charset="0"/>
             </a:endParaRPr>
           </a:p>
-          <a:p>
-            <a:r>
-              <a:rPr lang="en-US" dirty="0" smtClean="0">
-                <a:latin typeface="Arial" panose="020B0604020202020204" pitchFamily="34" charset="0"/>
-                <a:cs typeface="Arial" panose="020B0604020202020204" pitchFamily="34" charset="0"/>
-              </a:rPr>
-              <a:t>	The taxa are columns; the rows are samples</a:t>
-            </a:r>
-          </a:p>
-          <a:p>
-            <a:r>
-              <a:rPr lang="en-US" dirty="0">
-                <a:latin typeface="Arial" panose="020B0604020202020204" pitchFamily="34" charset="0"/>
-                <a:cs typeface="Arial" panose="020B0604020202020204" pitchFamily="34" charset="0"/>
-              </a:rPr>
-              <a:t>	</a:t>
-            </a:r>
-            <a:r>
-              <a:rPr lang="en-US" dirty="0" smtClean="0">
-                <a:latin typeface="Arial" panose="020B0604020202020204" pitchFamily="34" charset="0"/>
-                <a:cs typeface="Arial" panose="020B0604020202020204" pitchFamily="34" charset="0"/>
-              </a:rPr>
-              <a:t>The metadata (urban vs. rural, </a:t>
-            </a:r>
-            <a:r>
-              <a:rPr lang="en-US" dirty="0" err="1" smtClean="0">
-                <a:latin typeface="Arial" panose="020B0604020202020204" pitchFamily="34" charset="0"/>
-                <a:cs typeface="Arial" panose="020B0604020202020204" pitchFamily="34" charset="0"/>
-              </a:rPr>
-              <a:t>timepoint</a:t>
-            </a:r>
-            <a:r>
-              <a:rPr lang="en-US" dirty="0" smtClean="0">
-                <a:latin typeface="Arial" panose="020B0604020202020204" pitchFamily="34" charset="0"/>
-                <a:cs typeface="Arial" panose="020B0604020202020204" pitchFamily="34" charset="0"/>
-              </a:rPr>
-              <a:t>) are in the same spreadsheet as the relative abundance</a:t>
-            </a:r>
-          </a:p>
-          <a:p>
-            <a:r>
-              <a:rPr lang="en-US" dirty="0">
-                <a:latin typeface="Arial" panose="020B0604020202020204" pitchFamily="34" charset="0"/>
-                <a:cs typeface="Arial" panose="020B0604020202020204" pitchFamily="34" charset="0"/>
-              </a:rPr>
-              <a:t>	</a:t>
-            </a:r>
-            <a:r>
-              <a:rPr lang="en-US" dirty="0" smtClean="0">
-                <a:latin typeface="Arial" panose="020B0604020202020204" pitchFamily="34" charset="0"/>
-                <a:cs typeface="Arial" panose="020B0604020202020204" pitchFamily="34" charset="0"/>
-              </a:rPr>
-              <a:t>The counts are log-normalized according to the following formula</a:t>
-            </a:r>
-            <a:endParaRPr lang="en-US" dirty="0">
-              <a:latin typeface="Arial" panose="020B0604020202020204" pitchFamily="34" charset="0"/>
-              <a:cs typeface="Arial" panose="020B0604020202020204" pitchFamily="34" charset="0"/>
-            </a:endParaRPr>
+        </p:txBody>
+      </p:sp>
+      <p:sp>
+        <p:nvSpPr>
+          <p:cNvPr id="6" name="Rectangle 5"/>
+          <p:cNvSpPr/>
+          <p:nvPr/>
+        </p:nvSpPr>
+        <p:spPr>
+          <a:xfrm>
+            <a:off x="7475050" y="6263107"/>
+            <a:ext cx="4582152" cy="369332"/>
+          </a:xfrm>
+          <a:prstGeom prst="rect">
+            <a:avLst/>
+          </a:prstGeom>
+        </p:spPr>
+        <p:txBody>
+          <a:bodyPr wrap="none">
+            <a:spAutoFit/>
+          </a:bodyPr>
+          <a:lstStyle/>
+          <a:p>
+            <a:r>
+              <a:rPr lang="en-US" dirty="0"/>
+              <a:t>https://github.com/kwinglee/UrbanRuralChina</a:t>
+            </a:r>
           </a:p>
         </p:txBody>
       </p:sp>
       <p:pic>
         <p:nvPicPr>
-          <p:cNvPr id="5" name="Picture 4"/>
+          <p:cNvPr id="7" name="Picture 6"/>
           <p:cNvPicPr>
             <a:picLocks noChangeAspect="1"/>
           </p:cNvPicPr>
@@ -4132,46 +6168,59 @@
         </p:blipFill>
         <p:spPr>
           <a:xfrm>
-            <a:off x="2300809" y="1964844"/>
-            <a:ext cx="5903739" cy="2676968"/>
+            <a:off x="551234" y="1320892"/>
+            <a:ext cx="11264123" cy="2523269"/>
           </a:xfrm>
           <a:prstGeom prst="rect">
             <a:avLst/>
           </a:prstGeom>
         </p:spPr>
       </p:pic>
-      <p:sp>
-        <p:nvSpPr>
-          <p:cNvPr id="6" name="Rectangle 5"/>
-          <p:cNvSpPr/>
+      <p:pic>
+        <p:nvPicPr>
+          <p:cNvPr id="1026" name="Picture 2" descr="Winglee, Kathryn"/>
+          <p:cNvPicPr>
+            <a:picLocks noChangeAspect="1" noChangeArrowheads="1"/>
+          </p:cNvPicPr>
           <p:nvPr/>
-        </p:nvSpPr>
-        <p:spPr>
-          <a:xfrm>
-            <a:off x="5808099" y="4511562"/>
-            <a:ext cx="4696863" cy="369332"/>
+        </p:nvPicPr>
+        <p:blipFill>
+          <a:blip r:embed="rId3">
+            <a:extLst>
+              <a:ext uri="{28A0092B-C50C-407E-A947-70E740481C1C}">
+                <a14:useLocalDpi xmlns:a14="http://schemas.microsoft.com/office/drawing/2010/main" val="0"/>
+              </a:ext>
+            </a:extLst>
+          </a:blip>
+          <a:srcRect/>
+          <a:stretch>
+            <a:fillRect/>
+          </a:stretch>
+        </p:blipFill>
+        <p:spPr bwMode="auto">
+          <a:xfrm>
+            <a:off x="670142" y="4543512"/>
+            <a:ext cx="2095500" cy="1962150"/>
           </a:xfrm>
           <a:prstGeom prst="rect">
             <a:avLst/>
           </a:prstGeom>
-        </p:spPr>
-        <p:txBody>
-          <a:bodyPr wrap="none">
-            <a:spAutoFit/>
-          </a:bodyPr>
-          <a:lstStyle/>
-          <a:p>
-            <a:r>
-              <a:rPr lang="en-US" dirty="0"/>
-              <a:t>https://www.nature.com/articles/ismej2013106</a:t>
-            </a:r>
-          </a:p>
-        </p:txBody>
-      </p:sp>
+          <a:noFill/>
+          <a:extLst>
+            <a:ext uri="{909E8E84-426E-40DD-AFC4-6F175D3DCCD1}">
+              <a14:hiddenFill xmlns:a14="http://schemas.microsoft.com/office/drawing/2010/main">
+                <a:solidFill>
+                  <a:srgbClr val="FFFFFF"/>
+                </a:solidFill>
+              </a14:hiddenFill>
+            </a:ext>
+          </a:extLst>
+        </p:spPr>
+      </p:pic>
     </p:spTree>
     <p:extLst>
       <p:ext uri="{BB962C8B-B14F-4D97-AF65-F5344CB8AC3E}">
-        <p14:creationId xmlns:p14="http://schemas.microsoft.com/office/powerpoint/2010/main" val="1180504084"/>
+        <p14:creationId xmlns:p14="http://schemas.microsoft.com/office/powerpoint/2010/main" val="1962320976"/>
       </p:ext>
     </p:extLst>
   </p:cSld>
@@ -4213,8 +6262,8 @@
         </p:nvSpPr>
         <p:spPr>
           <a:xfrm>
-            <a:off x="557408" y="688932"/>
-            <a:ext cx="7246536" cy="1477328"/>
+            <a:off x="507304" y="400833"/>
+            <a:ext cx="5797421" cy="369332"/>
           </a:xfrm>
           <a:prstGeom prst="rect">
             <a:avLst/>
@@ -4232,49 +6281,71 @@
                 <a:latin typeface="Arial" panose="020B0604020202020204" pitchFamily="34" charset="0"/>
                 <a:cs typeface="Arial" panose="020B0604020202020204" pitchFamily="34" charset="0"/>
               </a:rPr>
-              <a:t>If you have your own dataset…</a:t>
-            </a:r>
-          </a:p>
-          <a:p>
+              <a:t>We will use this spreadsheet as our base input into R…</a:t>
+            </a:r>
             <a:endParaRPr lang="en-US" dirty="0">
               <a:latin typeface="Arial" panose="020B0604020202020204" pitchFamily="34" charset="0"/>
               <a:cs typeface="Arial" panose="020B0604020202020204" pitchFamily="34" charset="0"/>
             </a:endParaRPr>
           </a:p>
-          <a:p>
-            <a:r>
-              <a:rPr lang="en-US" dirty="0" smtClean="0">
-                <a:latin typeface="Arial" panose="020B0604020202020204" pitchFamily="34" charset="0"/>
-                <a:cs typeface="Arial" panose="020B0604020202020204" pitchFamily="34" charset="0"/>
-              </a:rPr>
-              <a:t>	We can work with you to get your data into the same format </a:t>
-            </a:r>
-          </a:p>
-          <a:p>
-            <a:endParaRPr lang="en-US" dirty="0">
-              <a:latin typeface="Arial" panose="020B0604020202020204" pitchFamily="34" charset="0"/>
-              <a:cs typeface="Arial" panose="020B0604020202020204" pitchFamily="34" charset="0"/>
-            </a:endParaRPr>
-          </a:p>
-          <a:p>
-            <a:r>
-              <a:rPr lang="en-US" dirty="0" smtClean="0">
-                <a:latin typeface="Arial" panose="020B0604020202020204" pitchFamily="34" charset="0"/>
-                <a:cs typeface="Arial" panose="020B0604020202020204" pitchFamily="34" charset="0"/>
-              </a:rPr>
-              <a:t>	(or to modify your R code to work with your table!)</a:t>
-            </a:r>
-            <a:endParaRPr lang="en-US" dirty="0">
-              <a:latin typeface="Arial" panose="020B0604020202020204" pitchFamily="34" charset="0"/>
-              <a:cs typeface="Arial" panose="020B0604020202020204" pitchFamily="34" charset="0"/>
-            </a:endParaRPr>
-          </a:p>
-        </p:txBody>
-      </p:sp>
+        </p:txBody>
+      </p:sp>
+      <p:sp>
+        <p:nvSpPr>
+          <p:cNvPr id="2" name="Rectangle 1"/>
+          <p:cNvSpPr/>
+          <p:nvPr/>
+        </p:nvSpPr>
+        <p:spPr>
+          <a:xfrm>
+            <a:off x="148224" y="6418255"/>
+            <a:ext cx="13536461" cy="338554"/>
+          </a:xfrm>
+          <a:prstGeom prst="rect">
+            <a:avLst/>
+          </a:prstGeom>
+        </p:spPr>
+        <p:txBody>
+          <a:bodyPr wrap="square">
+            <a:spAutoFit/>
+          </a:bodyPr>
+          <a:lstStyle/>
+          <a:p>
+            <a:r>
+              <a:rPr lang="en-US" sz="1600" dirty="0"/>
+              <a:t>https://github.com/kwinglee/UrbanRuralChina/blob/master/16SrRNA/inputData/RDP/genus_taxaAsColumnsLogNorm_WithMetadata.txt</a:t>
+            </a:r>
+          </a:p>
+        </p:txBody>
+      </p:sp>
+      <p:pic>
+        <p:nvPicPr>
+          <p:cNvPr id="5" name="Picture 4"/>
+          <p:cNvPicPr>
+            <a:picLocks noChangeAspect="1"/>
+          </p:cNvPicPr>
+          <p:nvPr/>
+        </p:nvPicPr>
+        <p:blipFill>
+          <a:blip r:embed="rId3"/>
+          <a:stretch>
+            <a:fillRect/>
+          </a:stretch>
+        </p:blipFill>
+        <p:spPr>
+          <a:xfrm>
+            <a:off x="344466" y="945385"/>
+            <a:ext cx="11360458" cy="3325989"/>
+          </a:xfrm>
+          <a:prstGeom prst="rect">
+            <a:avLst/>
+          </a:prstGeom>
+        </p:spPr>
+      </p:pic>
     </p:spTree>
     <p:extLst>
       <p:ext uri="{BB962C8B-B14F-4D97-AF65-F5344CB8AC3E}">
-        <p14:creationId xmlns:p14="http://schemas.microsoft.com/office/powerpoint/2010/main" val="1587977548"/>
+        <p14:creationId xmlns:p14="http://schemas.microsoft.com/office/powerpoint/2010/main" val="1514337921"/>
       </p:ext>
     </p:extLst>
   </p:cSld>
@@ -4316,8 +6387,8 @@
         </p:nvSpPr>
         <p:spPr>
           <a:xfrm>
-            <a:off x="68894" y="12527"/>
-            <a:ext cx="8195513" cy="923330"/>
+            <a:off x="544882" y="444674"/>
+            <a:ext cx="10982494" cy="1477328"/>
           </a:xfrm>
           <a:prstGeom prst="rect">
             <a:avLst/>
@@ -4335,7 +6406,7 @@
                 <a:latin typeface="Arial" panose="020B0604020202020204" pitchFamily="34" charset="0"/>
                 <a:cs typeface="Arial" panose="020B0604020202020204" pitchFamily="34" charset="0"/>
               </a:rPr>
-              <a:t>You will need to choose some normalization scheme..</a:t>
+              <a:t>This spreadsheet has the following features:</a:t>
             </a:r>
           </a:p>
           <a:p>
@@ -4350,7 +6421,53 @@
                 <a:latin typeface="Arial" panose="020B0604020202020204" pitchFamily="34" charset="0"/>
                 <a:cs typeface="Arial" panose="020B0604020202020204" pitchFamily="34" charset="0"/>
               </a:rPr>
-              <a:t>(Each sequence library will be of a different depth; you need to correct for that)</a:t>
+              <a:t>	The taxa are columns; the rows are samples</a:t>
+            </a:r>
+          </a:p>
+          <a:p>
+            <a:r>
+              <a:rPr lang="en-US" dirty="0">
+                <a:latin typeface="Arial" panose="020B0604020202020204" pitchFamily="34" charset="0"/>
+                <a:cs typeface="Arial" panose="020B0604020202020204" pitchFamily="34" charset="0"/>
+              </a:rPr>
+              <a:t>	</a:t>
+            </a:r>
+            <a:r>
+              <a:rPr lang="en-US" dirty="0" smtClean="0">
+                <a:latin typeface="Arial" panose="020B0604020202020204" pitchFamily="34" charset="0"/>
+                <a:cs typeface="Arial" panose="020B0604020202020204" pitchFamily="34" charset="0"/>
+              </a:rPr>
+              <a:t>The metadata (urban vs. rural, </a:t>
+            </a:r>
+            <a:r>
+              <a:rPr lang="en-US" dirty="0" err="1" smtClean="0">
+                <a:latin typeface="Arial" panose="020B0604020202020204" pitchFamily="34" charset="0"/>
+                <a:cs typeface="Arial" panose="020B0604020202020204" pitchFamily="34" charset="0"/>
+              </a:rPr>
+              <a:t>timepoint</a:t>
+            </a:r>
+            <a:r>
+              <a:rPr lang="en-US" dirty="0" smtClean="0">
+                <a:latin typeface="Arial" panose="020B0604020202020204" pitchFamily="34" charset="0"/>
+                <a:cs typeface="Arial" panose="020B0604020202020204" pitchFamily="34" charset="0"/>
+              </a:rPr>
+              <a:t>) are in the same spreadsheet as the relative abundance</a:t>
+            </a:r>
+          </a:p>
+          <a:p>
+            <a:r>
+              <a:rPr lang="en-US" dirty="0">
+                <a:latin typeface="Arial" panose="020B0604020202020204" pitchFamily="34" charset="0"/>
+                <a:cs typeface="Arial" panose="020B0604020202020204" pitchFamily="34" charset="0"/>
+              </a:rPr>
+              <a:t>	</a:t>
+            </a:r>
+            <a:r>
+              <a:rPr lang="en-US" dirty="0" smtClean="0">
+                <a:latin typeface="Arial" panose="020B0604020202020204" pitchFamily="34" charset="0"/>
+                <a:cs typeface="Arial" panose="020B0604020202020204" pitchFamily="34" charset="0"/>
+              </a:rPr>
+              <a:t>The counts are log-normalized according to the following formula</a:t>
             </a:r>
             <a:endParaRPr lang="en-US" dirty="0">
               <a:latin typeface="Arial" panose="020B0604020202020204" pitchFamily="34" charset="0"/>
@@ -4361,7 +6478,7 @@
       </p:sp>
       <p:pic>
         <p:nvPicPr>
-          <p:cNvPr id="6" name="Picture 5"/>
+          <p:cNvPr id="5" name="Picture 4"/>
           <p:cNvPicPr>
             <a:picLocks noChangeAspect="1"/>
           </p:cNvPicPr>
@@ -4375,8 +6492,8 @@
         </p:blipFill>
         <p:spPr>
           <a:xfrm>
-            <a:off x="2830424" y="935857"/>
-            <a:ext cx="5934672" cy="4572000"/>
+            <a:off x="2300809" y="1964844"/>
+            <a:ext cx="5903739" cy="2676968"/>
           </a:xfrm>
           <a:prstGeom prst="rect">
             <a:avLst/>
@@ -4385,86 +6502,28 @@
       </p:pic>
       <p:sp>
         <p:nvSpPr>
-          <p:cNvPr id="7" name="TextBox 6"/>
-          <p:cNvSpPr txBox="1"/>
+          <p:cNvPr id="6" name="Rectangle 5"/>
+          <p:cNvSpPr/>
           <p:nvPr/>
         </p:nvSpPr>
         <p:spPr>
           <a:xfrm>
-            <a:off x="338203" y="5549031"/>
-            <a:ext cx="11559575" cy="646331"/>
+            <a:off x="5808099" y="4511562"/>
+            <a:ext cx="4696863" cy="369332"/>
           </a:xfrm>
           <a:prstGeom prst="rect">
             <a:avLst/>
           </a:prstGeom>
-          <a:noFill/>
-        </p:spPr>
-        <p:txBody>
-          <a:bodyPr wrap="none" rtlCol="0">
+        </p:spPr>
+        <p:txBody>
+          <a:bodyPr wrap="none">
             <a:spAutoFit/>
           </a:bodyPr>
           <a:lstStyle/>
           <a:p>
             <a:r>
-              <a:rPr lang="en-US" dirty="0" smtClean="0">
-                <a:latin typeface="Arial" panose="020B0604020202020204" pitchFamily="34" charset="0"/>
-                <a:cs typeface="Arial" panose="020B0604020202020204" pitchFamily="34" charset="0"/>
-              </a:rPr>
-              <a:t>The easiest (not necessarily the best) approach is to divide each cell by the total # of sequences in that sample.</a:t>
-            </a:r>
-          </a:p>
-          <a:p>
-            <a:r>
-              <a:rPr lang="en-US" dirty="0" smtClean="0">
-                <a:latin typeface="Arial" panose="020B0604020202020204" pitchFamily="34" charset="0"/>
-                <a:cs typeface="Arial" panose="020B0604020202020204" pitchFamily="34" charset="0"/>
-              </a:rPr>
-              <a:t>This is relative abundance</a:t>
-            </a:r>
-            <a:endParaRPr lang="en-US" dirty="0">
-              <a:latin typeface="Arial" panose="020B0604020202020204" pitchFamily="34" charset="0"/>
-              <a:cs typeface="Arial" panose="020B0604020202020204" pitchFamily="34" charset="0"/>
-            </a:endParaRPr>
-          </a:p>
-        </p:txBody>
-      </p:sp>
-      <p:sp>
-        <p:nvSpPr>
-          <p:cNvPr id="8" name="TextBox 7"/>
-          <p:cNvSpPr txBox="1"/>
-          <p:nvPr/>
-        </p:nvSpPr>
-        <p:spPr>
-          <a:xfrm>
-            <a:off x="6469687" y="6538586"/>
-            <a:ext cx="5749651" cy="369332"/>
-          </a:xfrm>
-          <a:prstGeom prst="rect">
-            <a:avLst/>
-          </a:prstGeom>
-          <a:noFill/>
-        </p:spPr>
-        <p:txBody>
-          <a:bodyPr wrap="none" rtlCol="0">
-            <a:spAutoFit/>
-          </a:bodyPr>
-          <a:lstStyle/>
-          <a:p>
-            <a:r>
-              <a:rPr lang="en-US" dirty="0" smtClean="0"/>
-              <a:t>Table due to :Matthew </a:t>
-            </a:r>
-            <a:r>
               <a:rPr lang="en-US" dirty="0"/>
-              <a:t>C. B. </a:t>
-            </a:r>
-            <a:r>
-              <a:rPr lang="en-US" dirty="0" err="1"/>
-              <a:t>Tsilimigras</a:t>
-            </a:r>
-            <a:r>
-              <a:rPr lang="en-US" dirty="0"/>
-              <a:t> (Matthew C. Brown)</a:t>
+              <a:t>https://www.nature.com/articles/ismej2013106</a:t>
             </a:r>
           </a:p>
         </p:txBody>
@@ -4472,7 +6531,7 @@
     </p:spTree>
     <p:extLst>
       <p:ext uri="{BB962C8B-B14F-4D97-AF65-F5344CB8AC3E}">
-        <p14:creationId xmlns:p14="http://schemas.microsoft.com/office/powerpoint/2010/main" val="3437254749"/>
+        <p14:creationId xmlns:p14="http://schemas.microsoft.com/office/powerpoint/2010/main" val="1180504084"/>
       </p:ext>
     </p:extLst>
   </p:cSld>
@@ -4514,8 +6573,8 @@
         </p:nvSpPr>
         <p:spPr>
           <a:xfrm>
-            <a:off x="95740" y="134873"/>
-            <a:ext cx="11157863" cy="1754326"/>
+            <a:off x="557408" y="688932"/>
+            <a:ext cx="7246536" cy="1477328"/>
           </a:xfrm>
           <a:prstGeom prst="rect">
             <a:avLst/>
@@ -4533,7 +6592,7 @@
                 <a:latin typeface="Arial" panose="020B0604020202020204" pitchFamily="34" charset="0"/>
                 <a:cs typeface="Arial" panose="020B0604020202020204" pitchFamily="34" charset="0"/>
               </a:rPr>
-              <a:t>Let’s say you have a spreadsheet that is un-normalized and you want to change it to log relative abundance</a:t>
+              <a:t>If you have your own dataset…</a:t>
             </a:r>
           </a:p>
           <a:p>
@@ -4548,7 +6607,7 @@
                 <a:latin typeface="Arial" panose="020B0604020202020204" pitchFamily="34" charset="0"/>
                 <a:cs typeface="Arial" panose="020B0604020202020204" pitchFamily="34" charset="0"/>
               </a:rPr>
-              <a:t> </a:t>
+              <a:t>	We can work with you to get your data into the same format </a:t>
             </a:r>
           </a:p>
           <a:p>
@@ -4558,12 +6617,13 @@
             </a:endParaRPr>
           </a:p>
           <a:p>
-            <a:endParaRPr lang="en-US" dirty="0" smtClean="0">
-              <a:latin typeface="Arial" panose="020B0604020202020204" pitchFamily="34" charset="0"/>
-              <a:cs typeface="Arial" panose="020B0604020202020204" pitchFamily="34" charset="0"/>
-            </a:endParaRPr>
-          </a:p>
-          <a:p>
+            <a:r>
+              <a:rPr lang="en-US" dirty="0" smtClean="0">
+                <a:latin typeface="Arial" panose="020B0604020202020204" pitchFamily="34" charset="0"/>
+                <a:cs typeface="Arial" panose="020B0604020202020204" pitchFamily="34" charset="0"/>
+              </a:rPr>
+              <a:t>	(or to modify your R code to work with your table!)</a:t>
+            </a:r>
             <a:endParaRPr lang="en-US" dirty="0">
               <a:latin typeface="Arial" panose="020B0604020202020204" pitchFamily="34" charset="0"/>
               <a:cs typeface="Arial" panose="020B0604020202020204" pitchFamily="34" charset="0"/>
@@ -4571,98 +6631,152 @@
           </a:p>
         </p:txBody>
       </p:sp>
-      <p:sp>
-        <p:nvSpPr>
-          <p:cNvPr id="5" name="Rectangle 4"/>
-          <p:cNvSpPr/>
+    </p:spTree>
+    <p:extLst>
+      <p:ext uri="{BB962C8B-B14F-4D97-AF65-F5344CB8AC3E}">
+        <p14:creationId xmlns:p14="http://schemas.microsoft.com/office/powerpoint/2010/main" val="1587977548"/>
+      </p:ext>
+    </p:extLst>
+  </p:cSld>
+  <p:clrMapOvr>
+    <a:masterClrMapping/>
+  </p:clrMapOvr>
+  <p:timing>
+    <p:tnLst>
+      <p:par>
+        <p:cTn id="1" dur="indefinite" restart="never" nodeType="tmRoot"/>
+      </p:par>
+    </p:tnLst>
+  </p:timing>
+</p:sld>
+</file>
+
+<file path=ppt/slides/slide9.xml><?xml version="1.0" encoding="utf-8"?>
+<p:sld xmlns:a="http://schemas.openxmlformats.org/drawingml/2006/main" xmlns:r="http://schemas.openxmlformats.org/officeDocument/2006/relationships" xmlns:p="http://schemas.openxmlformats.org/presentationml/2006/main">
+  <p:cSld>
+    <p:spTree>
+      <p:nvGrpSpPr>
+        <p:cNvPr id="1" name=""/>
+        <p:cNvGrpSpPr/>
+        <p:nvPr/>
+      </p:nvGrpSpPr>
+      <p:grpSpPr>
+        <a:xfrm>
+          <a:off x="0" y="0"/>
+          <a:ext cx="0" cy="0"/>
+          <a:chOff x="0" y="0"/>
+          <a:chExt cx="0" cy="0"/>
+        </a:xfrm>
+      </p:grpSpPr>
+      <p:sp>
+        <p:nvSpPr>
+          <p:cNvPr id="4" name="TextBox 3"/>
+          <p:cNvSpPr txBox="1"/>
           <p:nvPr/>
         </p:nvSpPr>
         <p:spPr>
           <a:xfrm>
-            <a:off x="7227216" y="6126430"/>
-            <a:ext cx="2772554" cy="369332"/>
+            <a:off x="810228" y="665544"/>
+            <a:ext cx="4467890" cy="1477328"/>
           </a:xfrm>
           <a:prstGeom prst="rect">
             <a:avLst/>
           </a:prstGeom>
-        </p:spPr>
-        <p:txBody>
-          <a:bodyPr wrap="none">
+          <a:noFill/>
+        </p:spPr>
+        <p:txBody>
+          <a:bodyPr wrap="none" rtlCol="0">
             <a:spAutoFit/>
           </a:bodyPr>
           <a:lstStyle/>
           <a:p>
             <a:r>
-              <a:rPr lang="en-US" dirty="0"/>
-              <a:t>sweep(Y, 1, </a:t>
-            </a:r>
-            <a:r>
-              <a:rPr lang="en-US" dirty="0" err="1"/>
-              <a:t>rowSums</a:t>
-            </a:r>
-            <a:r>
-              <a:rPr lang="en-US" dirty="0"/>
-              <a:t>(Y), '/')</a:t>
-            </a:r>
-          </a:p>
-        </p:txBody>
-      </p:sp>
-      <p:pic>
-        <p:nvPicPr>
-          <p:cNvPr id="2" name="Picture 1"/>
-          <p:cNvPicPr>
-            <a:picLocks noChangeAspect="1"/>
-          </p:cNvPicPr>
+              <a:rPr lang="en-US" dirty="0" smtClean="0">
+                <a:latin typeface="Arial" panose="020B0604020202020204" pitchFamily="34" charset="0"/>
+                <a:cs typeface="Arial" panose="020B0604020202020204" pitchFamily="34" charset="0"/>
+              </a:rPr>
+              <a:t>Normalizing your data</a:t>
+            </a:r>
+          </a:p>
+          <a:p>
+            <a:r>
+              <a:rPr lang="en-US" dirty="0" smtClean="0">
+                <a:latin typeface="Arial" panose="020B0604020202020204" pitchFamily="34" charset="0"/>
+                <a:cs typeface="Arial" panose="020B0604020202020204" pitchFamily="34" charset="0"/>
+              </a:rPr>
+              <a:t>PCA Ordination</a:t>
+            </a:r>
+          </a:p>
+          <a:p>
+            <a:r>
+              <a:rPr lang="en-US" dirty="0" smtClean="0">
+                <a:latin typeface="Arial" panose="020B0604020202020204" pitchFamily="34" charset="0"/>
+                <a:cs typeface="Arial" panose="020B0604020202020204" pitchFamily="34" charset="0"/>
+              </a:rPr>
+              <a:t>Graphing everything into one big PDF ball</a:t>
+            </a:r>
+          </a:p>
+          <a:p>
+            <a:r>
+              <a:rPr lang="en-US" dirty="0" smtClean="0">
+                <a:latin typeface="Arial" panose="020B0604020202020204" pitchFamily="34" charset="0"/>
+                <a:cs typeface="Arial" panose="020B0604020202020204" pitchFamily="34" charset="0"/>
+              </a:rPr>
+              <a:t>Some Simple Statistical Models</a:t>
+            </a:r>
+          </a:p>
+          <a:p>
+            <a:r>
+              <a:rPr lang="en-US" dirty="0" smtClean="0">
+                <a:latin typeface="Arial" panose="020B0604020202020204" pitchFamily="34" charset="0"/>
+                <a:cs typeface="Arial" panose="020B0604020202020204" pitchFamily="34" charset="0"/>
+              </a:rPr>
+              <a:t>Some Not So Simple Statistical Models</a:t>
+            </a:r>
+            <a:endParaRPr lang="en-US" dirty="0">
+              <a:latin typeface="Arial" panose="020B0604020202020204" pitchFamily="34" charset="0"/>
+              <a:cs typeface="Arial" panose="020B0604020202020204" pitchFamily="34" charset="0"/>
+            </a:endParaRPr>
+          </a:p>
+        </p:txBody>
+      </p:sp>
+      <p:cxnSp>
+        <p:nvCxnSpPr>
+          <p:cNvPr id="6" name="Straight Arrow Connector 5"/>
+          <p:cNvCxnSpPr/>
           <p:nvPr/>
-        </p:nvPicPr>
-        <p:blipFill>
-          <a:blip r:embed="rId2"/>
-          <a:stretch>
-            <a:fillRect/>
-          </a:stretch>
-        </p:blipFill>
-        <p:spPr>
-          <a:xfrm>
-            <a:off x="260392" y="734670"/>
-            <a:ext cx="11637847" cy="4294530"/>
-          </a:xfrm>
-          <a:prstGeom prst="rect">
+        </p:nvCxnSpPr>
+        <p:spPr>
+          <a:xfrm flipH="1">
+            <a:off x="3252486" y="833372"/>
+            <a:ext cx="1209555" cy="0"/>
+          </a:xfrm>
+          <a:prstGeom prst="straightConnector1">
             <a:avLst/>
           </a:prstGeom>
-        </p:spPr>
-      </p:pic>
-      <p:sp>
-        <p:nvSpPr>
-          <p:cNvPr id="3" name="Rectangle 2"/>
-          <p:cNvSpPr/>
-          <p:nvPr/>
-        </p:nvSpPr>
-        <p:spPr>
-          <a:xfrm>
-            <a:off x="1716910" y="5362898"/>
-            <a:ext cx="11350907" cy="369332"/>
-          </a:xfrm>
-          <a:prstGeom prst="rect">
-            <a:avLst/>
-          </a:prstGeom>
-        </p:spPr>
-        <p:txBody>
-          <a:bodyPr wrap="square">
-            <a:spAutoFit/>
-          </a:bodyPr>
-          <a:lstStyle/>
-          <a:p>
-            <a:r>
-              <a:rPr lang="en-US" dirty="0"/>
-              <a:t>https://github.com/kwinglee/UrbanRuralChina/blob/master/16SrRNA/inputData/RDP/genus_taxaAsColumns.txt</a:t>
-            </a:r>
-          </a:p>
-        </p:txBody>
-      </p:sp>
+          <a:ln>
+            <a:tailEnd type="triangle"/>
+          </a:ln>
+        </p:spPr>
+        <p:style>
+          <a:lnRef idx="1">
+            <a:schemeClr val="accent1"/>
+          </a:lnRef>
+          <a:fillRef idx="0">
+            <a:schemeClr val="accent1"/>
+          </a:fillRef>
+          <a:effectRef idx="0">
+            <a:schemeClr val="accent1"/>
+          </a:effectRef>
+          <a:fontRef idx="minor">
+            <a:schemeClr val="tx1"/>
+          </a:fontRef>
+        </p:style>
+      </p:cxnSp>
     </p:spTree>
     <p:extLst>
       <p:ext uri="{BB962C8B-B14F-4D97-AF65-F5344CB8AC3E}">
-        <p14:creationId xmlns:p14="http://schemas.microsoft.com/office/powerpoint/2010/main" val="2817519161"/>
+        <p14:creationId xmlns:p14="http://schemas.microsoft.com/office/powerpoint/2010/main" val="2708516428"/>
       </p:ext>
     </p:extLst>
   </p:cSld>

</xml_diff>

<commit_message>
next is output of PCOA text file
</commit_message>
<xml_diff>
--- a/classes/ChapelHill2018/ch.pptx
+++ b/classes/ChapelHill2018/ch.pptx
@@ -5,7 +5,7 @@
     <p:sldMasterId id="2147483648" r:id="rId1"/>
   </p:sldMasterIdLst>
   <p:notesMasterIdLst>
-    <p:notesMasterId r:id="rId47"/>
+    <p:notesMasterId r:id="rId50"/>
   </p:notesMasterIdLst>
   <p:sldIdLst>
     <p:sldId id="256" r:id="rId2"/>
@@ -53,6 +53,9 @@
     <p:sldId id="298" r:id="rId44"/>
     <p:sldId id="299" r:id="rId45"/>
     <p:sldId id="300" r:id="rId46"/>
+    <p:sldId id="301" r:id="rId47"/>
+    <p:sldId id="302" r:id="rId48"/>
+    <p:sldId id="303" r:id="rId49"/>
   </p:sldIdLst>
   <p:sldSz cx="12192000" cy="6858000"/>
   <p:notesSz cx="6858000" cy="9144000"/>
@@ -241,7 +244,7 @@
           <a:p>
             <a:fld id="{0BB994B0-15EB-4171-B4A2-60B7410CFA19}" type="datetimeFigureOut">
               <a:rPr lang="en-US" smtClean="0"/>
-              <a:t>10/14/2018</a:t>
+              <a:t>10/15/2018</a:t>
             </a:fld>
             <a:endParaRPr lang="en-US"/>
           </a:p>
@@ -721,7 +724,7 @@
           <a:p>
             <a:fld id="{A72D5121-EDCD-4BC3-8884-07E7433927A8}" type="datetimeFigureOut">
               <a:rPr lang="en-US" smtClean="0"/>
-              <a:t>10/14/2018</a:t>
+              <a:t>10/15/2018</a:t>
             </a:fld>
             <a:endParaRPr lang="en-US"/>
           </a:p>
@@ -889,7 +892,7 @@
           <a:p>
             <a:fld id="{A72D5121-EDCD-4BC3-8884-07E7433927A8}" type="datetimeFigureOut">
               <a:rPr lang="en-US" smtClean="0"/>
-              <a:t>10/14/2018</a:t>
+              <a:t>10/15/2018</a:t>
             </a:fld>
             <a:endParaRPr lang="en-US"/>
           </a:p>
@@ -1067,7 +1070,7 @@
           <a:p>
             <a:fld id="{A72D5121-EDCD-4BC3-8884-07E7433927A8}" type="datetimeFigureOut">
               <a:rPr lang="en-US" smtClean="0"/>
-              <a:t>10/14/2018</a:t>
+              <a:t>10/15/2018</a:t>
             </a:fld>
             <a:endParaRPr lang="en-US"/>
           </a:p>
@@ -1235,7 +1238,7 @@
           <a:p>
             <a:fld id="{A72D5121-EDCD-4BC3-8884-07E7433927A8}" type="datetimeFigureOut">
               <a:rPr lang="en-US" smtClean="0"/>
-              <a:t>10/14/2018</a:t>
+              <a:t>10/15/2018</a:t>
             </a:fld>
             <a:endParaRPr lang="en-US"/>
           </a:p>
@@ -1480,7 +1483,7 @@
           <a:p>
             <a:fld id="{A72D5121-EDCD-4BC3-8884-07E7433927A8}" type="datetimeFigureOut">
               <a:rPr lang="en-US" smtClean="0"/>
-              <a:t>10/14/2018</a:t>
+              <a:t>10/15/2018</a:t>
             </a:fld>
             <a:endParaRPr lang="en-US"/>
           </a:p>
@@ -1709,7 +1712,7 @@
           <a:p>
             <a:fld id="{A72D5121-EDCD-4BC3-8884-07E7433927A8}" type="datetimeFigureOut">
               <a:rPr lang="en-US" smtClean="0"/>
-              <a:t>10/14/2018</a:t>
+              <a:t>10/15/2018</a:t>
             </a:fld>
             <a:endParaRPr lang="en-US"/>
           </a:p>
@@ -2073,7 +2076,7 @@
           <a:p>
             <a:fld id="{A72D5121-EDCD-4BC3-8884-07E7433927A8}" type="datetimeFigureOut">
               <a:rPr lang="en-US" smtClean="0"/>
-              <a:t>10/14/2018</a:t>
+              <a:t>10/15/2018</a:t>
             </a:fld>
             <a:endParaRPr lang="en-US"/>
           </a:p>
@@ -2190,7 +2193,7 @@
           <a:p>
             <a:fld id="{A72D5121-EDCD-4BC3-8884-07E7433927A8}" type="datetimeFigureOut">
               <a:rPr lang="en-US" smtClean="0"/>
-              <a:t>10/14/2018</a:t>
+              <a:t>10/15/2018</a:t>
             </a:fld>
             <a:endParaRPr lang="en-US"/>
           </a:p>
@@ -2285,7 +2288,7 @@
           <a:p>
             <a:fld id="{A72D5121-EDCD-4BC3-8884-07E7433927A8}" type="datetimeFigureOut">
               <a:rPr lang="en-US" smtClean="0"/>
-              <a:t>10/14/2018</a:t>
+              <a:t>10/15/2018</a:t>
             </a:fld>
             <a:endParaRPr lang="en-US"/>
           </a:p>
@@ -2560,7 +2563,7 @@
           <a:p>
             <a:fld id="{A72D5121-EDCD-4BC3-8884-07E7433927A8}" type="datetimeFigureOut">
               <a:rPr lang="en-US" smtClean="0"/>
-              <a:t>10/14/2018</a:t>
+              <a:t>10/15/2018</a:t>
             </a:fld>
             <a:endParaRPr lang="en-US"/>
           </a:p>
@@ -2812,7 +2815,7 @@
           <a:p>
             <a:fld id="{A72D5121-EDCD-4BC3-8884-07E7433927A8}" type="datetimeFigureOut">
               <a:rPr lang="en-US" smtClean="0"/>
-              <a:t>10/14/2018</a:t>
+              <a:t>10/15/2018</a:t>
             </a:fld>
             <a:endParaRPr lang="en-US"/>
           </a:p>
@@ -3023,7 +3026,7 @@
           <a:p>
             <a:fld id="{A72D5121-EDCD-4BC3-8884-07E7433927A8}" type="datetimeFigureOut">
               <a:rPr lang="en-US" smtClean="0"/>
-              <a:t>10/14/2018</a:t>
+              <a:t>10/15/2018</a:t>
             </a:fld>
             <a:endParaRPr lang="en-US"/>
           </a:p>
@@ -3540,6 +3543,13 @@
   <p:clrMapOvr>
     <a:masterClrMapping/>
   </p:clrMapOvr>
+  <p:timing>
+    <p:tnLst>
+      <p:par>
+        <p:cTn id="1" dur="indefinite" restart="never" nodeType="tmRoot"/>
+      </p:par>
+    </p:tnLst>
+  </p:timing>
 </p:sld>
 </file>
 
@@ -3719,6 +3729,13 @@
   <p:clrMapOvr>
     <a:masterClrMapping/>
   </p:clrMapOvr>
+  <p:timing>
+    <p:tnLst>
+      <p:par>
+        <p:cTn id="1" dur="indefinite" restart="never" nodeType="tmRoot"/>
+      </p:par>
+    </p:tnLst>
+  </p:timing>
 </p:sld>
 </file>
 
@@ -3866,6 +3883,13 @@
   <p:clrMapOvr>
     <a:masterClrMapping/>
   </p:clrMapOvr>
+  <p:timing>
+    <p:tnLst>
+      <p:par>
+        <p:cTn id="1" dur="indefinite" restart="never" nodeType="tmRoot"/>
+      </p:par>
+    </p:tnLst>
+  </p:timing>
 </p:sld>
 </file>
 
@@ -3983,6 +4007,13 @@
   <p:clrMapOvr>
     <a:masterClrMapping/>
   </p:clrMapOvr>
+  <p:timing>
+    <p:tnLst>
+      <p:par>
+        <p:cTn id="1" dur="indefinite" restart="never" nodeType="tmRoot"/>
+      </p:par>
+    </p:tnLst>
+  </p:timing>
 </p:sld>
 </file>
 
@@ -4069,6 +4100,13 @@
   <p:clrMapOvr>
     <a:masterClrMapping/>
   </p:clrMapOvr>
+  <p:timing>
+    <p:tnLst>
+      <p:par>
+        <p:cTn id="1" dur="indefinite" restart="never" nodeType="tmRoot"/>
+      </p:par>
+    </p:tnLst>
+  </p:timing>
 </p:sld>
 </file>
 
@@ -4358,6 +4396,13 @@
   <p:clrMapOvr>
     <a:masterClrMapping/>
   </p:clrMapOvr>
+  <p:timing>
+    <p:tnLst>
+      <p:par>
+        <p:cTn id="1" dur="indefinite" restart="never" nodeType="tmRoot"/>
+      </p:par>
+    </p:tnLst>
+  </p:timing>
 </p:sld>
 </file>
 
@@ -4496,6 +4541,13 @@
   <p:clrMapOvr>
     <a:masterClrMapping/>
   </p:clrMapOvr>
+  <p:timing>
+    <p:tnLst>
+      <p:par>
+        <p:cTn id="1" dur="indefinite" restart="never" nodeType="tmRoot"/>
+      </p:par>
+    </p:tnLst>
+  </p:timing>
 </p:sld>
 </file>
 
@@ -4648,6 +4700,13 @@
   <p:clrMapOvr>
     <a:masterClrMapping/>
   </p:clrMapOvr>
+  <p:timing>
+    <p:tnLst>
+      <p:par>
+        <p:cTn id="1" dur="indefinite" restart="never" nodeType="tmRoot"/>
+      </p:par>
+    </p:tnLst>
+  </p:timing>
 </p:sld>
 </file>
 
@@ -4734,6 +4793,13 @@
   <p:clrMapOvr>
     <a:masterClrMapping/>
   </p:clrMapOvr>
+  <p:timing>
+    <p:tnLst>
+      <p:par>
+        <p:cTn id="1" dur="indefinite" restart="never" nodeType="tmRoot"/>
+      </p:par>
+    </p:tnLst>
+  </p:timing>
 </p:sld>
 </file>
 
@@ -4834,6 +4900,13 @@
   <p:clrMapOvr>
     <a:masterClrMapping/>
   </p:clrMapOvr>
+  <p:timing>
+    <p:tnLst>
+      <p:par>
+        <p:cTn id="1" dur="indefinite" restart="never" nodeType="tmRoot"/>
+      </p:par>
+    </p:tnLst>
+  </p:timing>
 </p:sld>
 </file>
 
@@ -4948,6 +5021,13 @@
   <p:clrMapOvr>
     <a:masterClrMapping/>
   </p:clrMapOvr>
+  <p:timing>
+    <p:tnLst>
+      <p:par>
+        <p:cTn id="1" dur="indefinite" restart="never" nodeType="tmRoot"/>
+      </p:par>
+    </p:tnLst>
+  </p:timing>
 </p:sld>
 </file>
 
@@ -5049,6 +5129,13 @@
   <p:clrMapOvr>
     <a:masterClrMapping/>
   </p:clrMapOvr>
+  <p:timing>
+    <p:tnLst>
+      <p:par>
+        <p:cTn id="1" dur="indefinite" restart="never" nodeType="tmRoot"/>
+      </p:par>
+    </p:tnLst>
+  </p:timing>
 </p:sld>
 </file>
 
@@ -5142,6 +5229,13 @@
   <p:clrMapOvr>
     <a:masterClrMapping/>
   </p:clrMapOvr>
+  <p:timing>
+    <p:tnLst>
+      <p:par>
+        <p:cTn id="1" dur="indefinite" restart="never" nodeType="tmRoot"/>
+      </p:par>
+    </p:tnLst>
+  </p:timing>
 </p:sld>
 </file>
 
@@ -5376,6 +5470,13 @@
   <p:clrMapOvr>
     <a:masterClrMapping/>
   </p:clrMapOvr>
+  <p:timing>
+    <p:tnLst>
+      <p:par>
+        <p:cTn id="1" dur="indefinite" restart="never" nodeType="tmRoot"/>
+      </p:par>
+    </p:tnLst>
+  </p:timing>
 </p:sld>
 </file>
 
@@ -5462,6 +5563,13 @@
   <p:clrMapOvr>
     <a:masterClrMapping/>
   </p:clrMapOvr>
+  <p:timing>
+    <p:tnLst>
+      <p:par>
+        <p:cTn id="1" dur="indefinite" restart="never" nodeType="tmRoot"/>
+      </p:par>
+    </p:tnLst>
+  </p:timing>
 </p:sld>
 </file>
 
@@ -5490,7 +5598,7 @@
         </p:nvSpPr>
         <p:spPr>
           <a:xfrm>
-            <a:off x="810228" y="665544"/>
+            <a:off x="810228" y="677118"/>
             <a:ext cx="4467890" cy="1477328"/>
           </a:xfrm>
           <a:prstGeom prst="rect">
@@ -5558,7 +5666,7 @@
         </p:nvCxnSpPr>
         <p:spPr>
           <a:xfrm flipH="1">
-            <a:off x="2604304" y="1099588"/>
+            <a:off x="2604304" y="1111162"/>
             <a:ext cx="1209555" cy="0"/>
           </a:xfrm>
           <a:prstGeom prst="straightConnector1">
@@ -5593,6 +5701,13 @@
   <p:clrMapOvr>
     <a:masterClrMapping/>
   </p:clrMapOvr>
+  <p:timing>
+    <p:tnLst>
+      <p:par>
+        <p:cTn id="1" dur="indefinite" restart="never" nodeType="tmRoot"/>
+      </p:par>
+    </p:tnLst>
+  </p:timing>
 </p:sld>
 </file>
 
@@ -5777,6 +5892,13 @@
   <p:clrMapOvr>
     <a:masterClrMapping/>
   </p:clrMapOvr>
+  <p:timing>
+    <p:tnLst>
+      <p:par>
+        <p:cTn id="1" dur="indefinite" restart="never" nodeType="tmRoot"/>
+      </p:par>
+    </p:tnLst>
+  </p:timing>
 </p:sld>
 </file>
 
@@ -5903,6 +6025,13 @@
   <p:clrMapOvr>
     <a:masterClrMapping/>
   </p:clrMapOvr>
+  <p:timing>
+    <p:tnLst>
+      <p:par>
+        <p:cTn id="1" dur="indefinite" restart="never" nodeType="tmRoot"/>
+      </p:par>
+    </p:tnLst>
+  </p:timing>
 </p:sld>
 </file>
 
@@ -6171,6 +6300,13 @@
   <p:clrMapOvr>
     <a:masterClrMapping/>
   </p:clrMapOvr>
+  <p:timing>
+    <p:tnLst>
+      <p:par>
+        <p:cTn id="1" dur="indefinite" restart="never" nodeType="tmRoot"/>
+      </p:par>
+    </p:tnLst>
+  </p:timing>
 </p:sld>
 </file>
 
@@ -6333,6 +6469,13 @@
   <p:clrMapOvr>
     <a:masterClrMapping/>
   </p:clrMapOvr>
+  <p:timing>
+    <p:tnLst>
+      <p:par>
+        <p:cTn id="1" dur="indefinite" restart="never" nodeType="tmRoot"/>
+      </p:par>
+    </p:tnLst>
+  </p:timing>
 </p:sld>
 </file>
 
@@ -6513,6 +6656,13 @@
   <p:clrMapOvr>
     <a:masterClrMapping/>
   </p:clrMapOvr>
+  <p:timing>
+    <p:tnLst>
+      <p:par>
+        <p:cTn id="1" dur="indefinite" restart="never" nodeType="tmRoot"/>
+      </p:par>
+    </p:tnLst>
+  </p:timing>
 </p:sld>
 </file>
 
@@ -6684,6 +6834,13 @@
   <p:clrMapOvr>
     <a:masterClrMapping/>
   </p:clrMapOvr>
+  <p:timing>
+    <p:tnLst>
+      <p:par>
+        <p:cTn id="1" dur="indefinite" restart="never" nodeType="tmRoot"/>
+      </p:par>
+    </p:tnLst>
+  </p:timing>
 </p:sld>
 </file>
 
@@ -6782,6 +6939,13 @@
   <p:clrMapOvr>
     <a:masterClrMapping/>
   </p:clrMapOvr>
+  <p:timing>
+    <p:tnLst>
+      <p:par>
+        <p:cTn id="1" dur="indefinite" restart="never" nodeType="tmRoot"/>
+      </p:par>
+    </p:tnLst>
+  </p:timing>
 </p:sld>
 </file>
 
@@ -6889,6 +7053,13 @@
   <p:clrMapOvr>
     <a:masterClrMapping/>
   </p:clrMapOvr>
+  <p:timing>
+    <p:tnLst>
+      <p:par>
+        <p:cTn id="1" dur="indefinite" restart="never" nodeType="tmRoot"/>
+      </p:par>
+    </p:tnLst>
+  </p:timing>
 </p:sld>
 </file>
 
@@ -7060,6 +7231,13 @@
   <p:clrMapOvr>
     <a:masterClrMapping/>
   </p:clrMapOvr>
+  <p:timing>
+    <p:tnLst>
+      <p:par>
+        <p:cTn id="1" dur="indefinite" restart="never" nodeType="tmRoot"/>
+      </p:par>
+    </p:tnLst>
+  </p:timing>
 </p:sld>
 </file>
 
@@ -7242,6 +7420,13 @@
   <p:clrMapOvr>
     <a:masterClrMapping/>
   </p:clrMapOvr>
+  <p:timing>
+    <p:tnLst>
+      <p:par>
+        <p:cTn id="1" dur="indefinite" restart="never" nodeType="tmRoot"/>
+      </p:par>
+    </p:tnLst>
+  </p:timing>
 </p:sld>
 </file>
 
@@ -7418,6 +7603,13 @@
   <p:clrMapOvr>
     <a:masterClrMapping/>
   </p:clrMapOvr>
+  <p:timing>
+    <p:tnLst>
+      <p:par>
+        <p:cTn id="1" dur="indefinite" restart="never" nodeType="tmRoot"/>
+      </p:par>
+    </p:tnLst>
+  </p:timing>
 </p:sld>
 </file>
 
@@ -7673,6 +7865,13 @@
   <p:clrMapOvr>
     <a:masterClrMapping/>
   </p:clrMapOvr>
+  <p:timing>
+    <p:tnLst>
+      <p:par>
+        <p:cTn id="1" dur="indefinite" restart="never" nodeType="tmRoot"/>
+      </p:par>
+    </p:tnLst>
+  </p:timing>
 </p:sld>
 </file>
 
@@ -7859,6 +8058,13 @@
   <p:clrMapOvr>
     <a:masterClrMapping/>
   </p:clrMapOvr>
+  <p:timing>
+    <p:tnLst>
+      <p:par>
+        <p:cTn id="1" dur="indefinite" restart="never" nodeType="tmRoot"/>
+      </p:par>
+    </p:tnLst>
+  </p:timing>
 </p:sld>
 </file>
 
@@ -8044,6 +8250,13 @@
   <p:clrMapOvr>
     <a:masterClrMapping/>
   </p:clrMapOvr>
+  <p:timing>
+    <p:tnLst>
+      <p:par>
+        <p:cTn id="1" dur="indefinite" restart="never" nodeType="tmRoot"/>
+      </p:par>
+    </p:tnLst>
+  </p:timing>
 </p:sld>
 </file>
 
@@ -8228,6 +8441,13 @@
   <p:clrMapOvr>
     <a:masterClrMapping/>
   </p:clrMapOvr>
+  <p:timing>
+    <p:tnLst>
+      <p:par>
+        <p:cTn id="1" dur="indefinite" restart="never" nodeType="tmRoot"/>
+      </p:par>
+    </p:tnLst>
+  </p:timing>
 </p:sld>
 </file>
 
@@ -8409,6 +8629,13 @@
   <p:clrMapOvr>
     <a:masterClrMapping/>
   </p:clrMapOvr>
+  <p:timing>
+    <p:tnLst>
+      <p:par>
+        <p:cTn id="1" dur="indefinite" restart="never" nodeType="tmRoot"/>
+      </p:par>
+    </p:tnLst>
+  </p:timing>
 </p:sld>
 </file>
 
@@ -8564,6 +8791,13 @@
   <p:clrMapOvr>
     <a:masterClrMapping/>
   </p:clrMapOvr>
+  <p:timing>
+    <p:tnLst>
+      <p:par>
+        <p:cTn id="1" dur="indefinite" restart="never" nodeType="tmRoot"/>
+      </p:par>
+    </p:tnLst>
+  </p:timing>
 </p:sld>
 </file>
 
@@ -8705,6 +8939,13 @@
   <p:clrMapOvr>
     <a:masterClrMapping/>
   </p:clrMapOvr>
+  <p:timing>
+    <p:tnLst>
+      <p:par>
+        <p:cTn id="1" dur="indefinite" restart="never" nodeType="tmRoot"/>
+      </p:par>
+    </p:tnLst>
+  </p:timing>
 </p:sld>
 </file>
 
@@ -8877,6 +9118,13 @@
   <p:clrMapOvr>
     <a:masterClrMapping/>
   </p:clrMapOvr>
+  <p:timing>
+    <p:tnLst>
+      <p:par>
+        <p:cTn id="1" dur="indefinite" restart="never" nodeType="tmRoot"/>
+      </p:par>
+    </p:tnLst>
+  </p:timing>
 </p:sld>
 </file>
 
@@ -9079,6 +9327,13 @@
   <p:clrMapOvr>
     <a:masterClrMapping/>
   </p:clrMapOvr>
+  <p:timing>
+    <p:tnLst>
+      <p:par>
+        <p:cTn id="1" dur="indefinite" restart="never" nodeType="tmRoot"/>
+      </p:par>
+    </p:tnLst>
+  </p:timing>
 </p:sld>
 </file>
 
@@ -9177,6 +9432,13 @@
   <p:clrMapOvr>
     <a:masterClrMapping/>
   </p:clrMapOvr>
+  <p:timing>
+    <p:tnLst>
+      <p:par>
+        <p:cTn id="1" dur="indefinite" restart="never" nodeType="tmRoot"/>
+      </p:par>
+    </p:tnLst>
+  </p:timing>
 </p:sld>
 </file>
 
@@ -9516,6 +9778,13 @@
   <p:clrMapOvr>
     <a:masterClrMapping/>
   </p:clrMapOvr>
+  <p:timing>
+    <p:tnLst>
+      <p:par>
+        <p:cTn id="1" dur="indefinite" restart="never" nodeType="tmRoot"/>
+      </p:par>
+    </p:tnLst>
+  </p:timing>
 </p:sld>
 </file>
 
@@ -9610,6 +9879,13 @@
   <p:clrMapOvr>
     <a:masterClrMapping/>
   </p:clrMapOvr>
+  <p:timing>
+    <p:tnLst>
+      <p:par>
+        <p:cTn id="1" dur="indefinite" restart="never" nodeType="tmRoot"/>
+      </p:par>
+    </p:tnLst>
+  </p:timing>
 </p:sld>
 </file>
 
@@ -9754,7 +10030,7 @@
         </p:blipFill>
         <p:spPr>
           <a:xfrm>
-            <a:off x="7519181" y="279400"/>
+            <a:off x="7519181" y="285187"/>
             <a:ext cx="4222685" cy="4216400"/>
           </a:xfrm>
           <a:prstGeom prst="rect">
@@ -9772,6 +10048,542 @@
   <p:clrMapOvr>
     <a:masterClrMapping/>
   </p:clrMapOvr>
+  <p:timing>
+    <p:tnLst>
+      <p:par>
+        <p:cTn id="1" dur="indefinite" restart="never" nodeType="tmRoot"/>
+      </p:par>
+    </p:tnLst>
+  </p:timing>
+</p:sld>
+</file>
+
+<file path=ppt/slides/slide46.xml><?xml version="1.0" encoding="utf-8"?>
+<p:sld xmlns:a="http://schemas.openxmlformats.org/drawingml/2006/main" xmlns:r="http://schemas.openxmlformats.org/officeDocument/2006/relationships" xmlns:p="http://schemas.openxmlformats.org/presentationml/2006/main">
+  <p:cSld>
+    <p:spTree>
+      <p:nvGrpSpPr>
+        <p:cNvPr id="1" name=""/>
+        <p:cNvGrpSpPr/>
+        <p:nvPr/>
+      </p:nvGrpSpPr>
+      <p:grpSpPr>
+        <a:xfrm>
+          <a:off x="0" y="0"/>
+          <a:ext cx="0" cy="0"/>
+          <a:chOff x="0" y="0"/>
+          <a:chExt cx="0" cy="0"/>
+        </a:xfrm>
+      </p:grpSpPr>
+      <p:sp>
+        <p:nvSpPr>
+          <p:cNvPr id="4" name="TextBox 3"/>
+          <p:cNvSpPr txBox="1"/>
+          <p:nvPr/>
+        </p:nvSpPr>
+        <p:spPr>
+          <a:xfrm>
+            <a:off x="497711" y="104173"/>
+            <a:ext cx="9580508" cy="646331"/>
+          </a:xfrm>
+          <a:prstGeom prst="rect">
+            <a:avLst/>
+          </a:prstGeom>
+          <a:noFill/>
+        </p:spPr>
+        <p:txBody>
+          <a:bodyPr wrap="none" rtlCol="0">
+            <a:spAutoFit/>
+          </a:bodyPr>
+          <a:lstStyle/>
+          <a:p>
+            <a:r>
+              <a:rPr lang="en-US" dirty="0" smtClean="0">
+                <a:latin typeface="Arial" panose="020B0604020202020204" pitchFamily="34" charset="0"/>
+                <a:cs typeface="Arial" panose="020B0604020202020204" pitchFamily="34" charset="0"/>
+              </a:rPr>
+              <a:t>We can make one more refinement.  How much duplicate information was there in the taxa?</a:t>
+            </a:r>
+          </a:p>
+          <a:p>
+            <a:r>
+              <a:rPr lang="en-US" dirty="0" smtClean="0">
+                <a:latin typeface="Arial" panose="020B0604020202020204" pitchFamily="34" charset="0"/>
+                <a:cs typeface="Arial" panose="020B0604020202020204" pitchFamily="34" charset="0"/>
+              </a:rPr>
+              <a:t>That is, how much were the taxa correlated?  How good was our compression?</a:t>
+            </a:r>
+            <a:endParaRPr lang="en-US" dirty="0">
+              <a:latin typeface="Arial" panose="020B0604020202020204" pitchFamily="34" charset="0"/>
+              <a:cs typeface="Arial" panose="020B0604020202020204" pitchFamily="34" charset="0"/>
+            </a:endParaRPr>
+          </a:p>
+        </p:txBody>
+      </p:sp>
+      <p:pic>
+        <p:nvPicPr>
+          <p:cNvPr id="5" name="Picture 4"/>
+          <p:cNvPicPr>
+            <a:picLocks noChangeAspect="1"/>
+          </p:cNvPicPr>
+          <p:nvPr/>
+        </p:nvPicPr>
+        <p:blipFill>
+          <a:blip r:embed="rId2"/>
+          <a:stretch>
+            <a:fillRect/>
+          </a:stretch>
+        </p:blipFill>
+        <p:spPr>
+          <a:xfrm>
+            <a:off x="1469985" y="1334358"/>
+            <a:ext cx="9476423" cy="4285250"/>
+          </a:xfrm>
+          <a:prstGeom prst="rect">
+            <a:avLst/>
+          </a:prstGeom>
+        </p:spPr>
+      </p:pic>
+      <p:sp>
+        <p:nvSpPr>
+          <p:cNvPr id="6" name="TextBox 5"/>
+          <p:cNvSpPr txBox="1"/>
+          <p:nvPr/>
+        </p:nvSpPr>
+        <p:spPr>
+          <a:xfrm>
+            <a:off x="677119" y="792867"/>
+            <a:ext cx="7490192" cy="369332"/>
+          </a:xfrm>
+          <a:prstGeom prst="rect">
+            <a:avLst/>
+          </a:prstGeom>
+          <a:noFill/>
+        </p:spPr>
+        <p:txBody>
+          <a:bodyPr wrap="none" rtlCol="0">
+            <a:spAutoFit/>
+          </a:bodyPr>
+          <a:lstStyle/>
+          <a:p>
+            <a:r>
+              <a:rPr lang="en-US" dirty="0" smtClean="0">
+                <a:latin typeface="Arial" panose="020B0604020202020204" pitchFamily="34" charset="0"/>
+                <a:cs typeface="Arial" panose="020B0604020202020204" pitchFamily="34" charset="0"/>
+              </a:rPr>
+              <a:t>We can use the “summary” command and R will yield this information…</a:t>
+            </a:r>
+            <a:endParaRPr lang="en-US" dirty="0">
+              <a:latin typeface="Arial" panose="020B0604020202020204" pitchFamily="34" charset="0"/>
+              <a:cs typeface="Arial" panose="020B0604020202020204" pitchFamily="34" charset="0"/>
+            </a:endParaRPr>
+          </a:p>
+        </p:txBody>
+      </p:sp>
+      <p:sp>
+        <p:nvSpPr>
+          <p:cNvPr id="2" name="Rectangle 1"/>
+          <p:cNvSpPr/>
+          <p:nvPr/>
+        </p:nvSpPr>
+        <p:spPr>
+          <a:xfrm>
+            <a:off x="4545028" y="6369479"/>
+            <a:ext cx="6992555" cy="369332"/>
+          </a:xfrm>
+          <a:prstGeom prst="rect">
+            <a:avLst/>
+          </a:prstGeom>
+        </p:spPr>
+        <p:txBody>
+          <a:bodyPr wrap="none">
+            <a:spAutoFit/>
+          </a:bodyPr>
+          <a:lstStyle/>
+          <a:p>
+            <a:r>
+              <a:rPr lang="en-US" dirty="0"/>
+              <a:t>more details at http://afodor.github.io/classes/stats2015/Lecture19.pptx</a:t>
+            </a:r>
+          </a:p>
+        </p:txBody>
+      </p:sp>
+    </p:spTree>
+    <p:extLst>
+      <p:ext uri="{BB962C8B-B14F-4D97-AF65-F5344CB8AC3E}">
+        <p14:creationId xmlns:p14="http://schemas.microsoft.com/office/powerpoint/2010/main" val="2750157642"/>
+      </p:ext>
+    </p:extLst>
+  </p:cSld>
+  <p:clrMapOvr>
+    <a:masterClrMapping/>
+  </p:clrMapOvr>
+  <p:timing>
+    <p:tnLst>
+      <p:par>
+        <p:cTn id="1" dur="indefinite" restart="never" nodeType="tmRoot"/>
+      </p:par>
+    </p:tnLst>
+  </p:timing>
+</p:sld>
+</file>
+
+<file path=ppt/slides/slide47.xml><?xml version="1.0" encoding="utf-8"?>
+<p:sld xmlns:a="http://schemas.openxmlformats.org/drawingml/2006/main" xmlns:r="http://schemas.openxmlformats.org/officeDocument/2006/relationships" xmlns:p="http://schemas.openxmlformats.org/presentationml/2006/main">
+  <p:cSld>
+    <p:spTree>
+      <p:nvGrpSpPr>
+        <p:cNvPr id="1" name=""/>
+        <p:cNvGrpSpPr/>
+        <p:nvPr/>
+      </p:nvGrpSpPr>
+      <p:grpSpPr>
+        <a:xfrm>
+          <a:off x="0" y="0"/>
+          <a:ext cx="0" cy="0"/>
+          <a:chOff x="0" y="0"/>
+          <a:chExt cx="0" cy="0"/>
+        </a:xfrm>
+      </p:grpSpPr>
+      <p:pic>
+        <p:nvPicPr>
+          <p:cNvPr id="8" name="Picture 7"/>
+          <p:cNvPicPr>
+            <a:picLocks noChangeAspect="1"/>
+          </p:cNvPicPr>
+          <p:nvPr/>
+        </p:nvPicPr>
+        <p:blipFill>
+          <a:blip r:embed="rId2"/>
+          <a:stretch>
+            <a:fillRect/>
+          </a:stretch>
+        </p:blipFill>
+        <p:spPr>
+          <a:xfrm>
+            <a:off x="717631" y="968025"/>
+            <a:ext cx="8121280" cy="5016085"/>
+          </a:xfrm>
+          <a:prstGeom prst="rect">
+            <a:avLst/>
+          </a:prstGeom>
+        </p:spPr>
+      </p:pic>
+      <p:sp>
+        <p:nvSpPr>
+          <p:cNvPr id="4" name="TextBox 3"/>
+          <p:cNvSpPr txBox="1"/>
+          <p:nvPr/>
+        </p:nvSpPr>
+        <p:spPr>
+          <a:xfrm>
+            <a:off x="619246" y="231494"/>
+            <a:ext cx="6310382" cy="369332"/>
+          </a:xfrm>
+          <a:prstGeom prst="rect">
+            <a:avLst/>
+          </a:prstGeom>
+          <a:noFill/>
+        </p:spPr>
+        <p:txBody>
+          <a:bodyPr wrap="none" rtlCol="0">
+            <a:spAutoFit/>
+          </a:bodyPr>
+          <a:lstStyle/>
+          <a:p>
+            <a:r>
+              <a:rPr lang="en-US" dirty="0" smtClean="0">
+                <a:latin typeface="Arial" panose="020B0604020202020204" pitchFamily="34" charset="0"/>
+                <a:cs typeface="Arial" panose="020B0604020202020204" pitchFamily="34" charset="0"/>
+              </a:rPr>
+              <a:t>We can (in this case manually) add this to our graph script…</a:t>
+            </a:r>
+            <a:endParaRPr lang="en-US" dirty="0">
+              <a:latin typeface="Arial" panose="020B0604020202020204" pitchFamily="34" charset="0"/>
+              <a:cs typeface="Arial" panose="020B0604020202020204" pitchFamily="34" charset="0"/>
+            </a:endParaRPr>
+          </a:p>
+        </p:txBody>
+      </p:sp>
+      <p:sp>
+        <p:nvSpPr>
+          <p:cNvPr id="5" name="Rectangle 4">
+            <a:extLst>
+              <a:ext uri="{FF2B5EF4-FFF2-40B4-BE49-F238E27FC236}">
+                <a16:creationId xmlns:a16="http://schemas.microsoft.com/office/drawing/2014/main" id="{75EE7ABA-ED72-4E19-9B15-B2748651470C}"/>
+              </a:ext>
+            </a:extLst>
+          </p:cNvPr>
+          <p:cNvSpPr/>
+          <p:nvPr/>
+        </p:nvSpPr>
+        <p:spPr>
+          <a:xfrm>
+            <a:off x="1917700" y="6482881"/>
+            <a:ext cx="10566400" cy="369332"/>
+          </a:xfrm>
+          <a:prstGeom prst="rect">
+            <a:avLst/>
+          </a:prstGeom>
+        </p:spPr>
+        <p:txBody>
+          <a:bodyPr wrap="square">
+            <a:spAutoFit/>
+          </a:bodyPr>
+          <a:lstStyle/>
+          <a:p>
+            <a:r>
+              <a:rPr lang="en-US" dirty="0"/>
+              <a:t>https://github.com/afodor/metagenomicsTools/blob/master/src/classExamples/ch2018/quickOrdination.txt</a:t>
+            </a:r>
+          </a:p>
+        </p:txBody>
+      </p:sp>
+      <p:pic>
+        <p:nvPicPr>
+          <p:cNvPr id="7" name="Picture 6"/>
+          <p:cNvPicPr>
+            <a:picLocks noChangeAspect="1"/>
+          </p:cNvPicPr>
+          <p:nvPr/>
+        </p:nvPicPr>
+        <p:blipFill>
+          <a:blip r:embed="rId3"/>
+          <a:stretch>
+            <a:fillRect/>
+          </a:stretch>
+        </p:blipFill>
+        <p:spPr>
+          <a:xfrm>
+            <a:off x="7517757" y="544009"/>
+            <a:ext cx="4092367" cy="4084375"/>
+          </a:xfrm>
+          <a:prstGeom prst="rect">
+            <a:avLst/>
+          </a:prstGeom>
+        </p:spPr>
+      </p:pic>
+      <p:cxnSp>
+        <p:nvCxnSpPr>
+          <p:cNvPr id="12" name="Straight Arrow Connector 11"/>
+          <p:cNvCxnSpPr/>
+          <p:nvPr/>
+        </p:nvCxnSpPr>
+        <p:spPr>
+          <a:xfrm flipV="1">
+            <a:off x="1713053" y="5532699"/>
+            <a:ext cx="347241" cy="202557"/>
+          </a:xfrm>
+          <a:prstGeom prst="straightConnector1">
+            <a:avLst/>
+          </a:prstGeom>
+          <a:ln>
+            <a:tailEnd type="triangle"/>
+          </a:ln>
+        </p:spPr>
+        <p:style>
+          <a:lnRef idx="1">
+            <a:schemeClr val="accent1"/>
+          </a:lnRef>
+          <a:fillRef idx="0">
+            <a:schemeClr val="accent1"/>
+          </a:fillRef>
+          <a:effectRef idx="0">
+            <a:schemeClr val="accent1"/>
+          </a:effectRef>
+          <a:fontRef idx="minor">
+            <a:schemeClr val="tx1"/>
+          </a:fontRef>
+        </p:style>
+      </p:cxnSp>
+      <p:cxnSp>
+        <p:nvCxnSpPr>
+          <p:cNvPr id="14" name="Straight Arrow Connector 13"/>
+          <p:cNvCxnSpPr/>
+          <p:nvPr/>
+        </p:nvCxnSpPr>
+        <p:spPr>
+          <a:xfrm flipV="1">
+            <a:off x="4375230" y="5532699"/>
+            <a:ext cx="283580" cy="202557"/>
+          </a:xfrm>
+          <a:prstGeom prst="straightConnector1">
+            <a:avLst/>
+          </a:prstGeom>
+          <a:ln>
+            <a:tailEnd type="triangle"/>
+          </a:ln>
+        </p:spPr>
+        <p:style>
+          <a:lnRef idx="1">
+            <a:schemeClr val="accent1"/>
+          </a:lnRef>
+          <a:fillRef idx="0">
+            <a:schemeClr val="accent1"/>
+          </a:fillRef>
+          <a:effectRef idx="0">
+            <a:schemeClr val="accent1"/>
+          </a:effectRef>
+          <a:fontRef idx="minor">
+            <a:schemeClr val="tx1"/>
+          </a:fontRef>
+        </p:style>
+      </p:cxnSp>
+    </p:spTree>
+    <p:extLst>
+      <p:ext uri="{BB962C8B-B14F-4D97-AF65-F5344CB8AC3E}">
+        <p14:creationId xmlns:p14="http://schemas.microsoft.com/office/powerpoint/2010/main" val="2427181130"/>
+      </p:ext>
+    </p:extLst>
+  </p:cSld>
+  <p:clrMapOvr>
+    <a:masterClrMapping/>
+  </p:clrMapOvr>
+  <p:timing>
+    <p:tnLst>
+      <p:par>
+        <p:cTn id="1" dur="indefinite" restart="never" nodeType="tmRoot"/>
+      </p:par>
+    </p:tnLst>
+  </p:timing>
+</p:sld>
+</file>
+
+<file path=ppt/slides/slide48.xml><?xml version="1.0" encoding="utf-8"?>
+<p:sld xmlns:a="http://schemas.openxmlformats.org/drawingml/2006/main" xmlns:r="http://schemas.openxmlformats.org/officeDocument/2006/relationships" xmlns:p="http://schemas.openxmlformats.org/presentationml/2006/main">
+  <p:cSld>
+    <p:spTree>
+      <p:nvGrpSpPr>
+        <p:cNvPr id="1" name=""/>
+        <p:cNvGrpSpPr/>
+        <p:nvPr/>
+      </p:nvGrpSpPr>
+      <p:grpSpPr>
+        <a:xfrm>
+          <a:off x="0" y="0"/>
+          <a:ext cx="0" cy="0"/>
+          <a:chOff x="0" y="0"/>
+          <a:chExt cx="0" cy="0"/>
+        </a:xfrm>
+      </p:grpSpPr>
+      <p:sp>
+        <p:nvSpPr>
+          <p:cNvPr id="4" name="TextBox 3"/>
+          <p:cNvSpPr txBox="1"/>
+          <p:nvPr/>
+        </p:nvSpPr>
+        <p:spPr>
+          <a:xfrm>
+            <a:off x="810228" y="665544"/>
+            <a:ext cx="4467890" cy="1477328"/>
+          </a:xfrm>
+          <a:prstGeom prst="rect">
+            <a:avLst/>
+          </a:prstGeom>
+          <a:noFill/>
+        </p:spPr>
+        <p:txBody>
+          <a:bodyPr wrap="none" rtlCol="0">
+            <a:spAutoFit/>
+          </a:bodyPr>
+          <a:lstStyle/>
+          <a:p>
+            <a:r>
+              <a:rPr lang="en-US" dirty="0">
+                <a:latin typeface="Arial" panose="020B0604020202020204" pitchFamily="34" charset="0"/>
+                <a:cs typeface="Arial" panose="020B0604020202020204" pitchFamily="34" charset="0"/>
+              </a:rPr>
+              <a:t>Normalizing your data</a:t>
+            </a:r>
+          </a:p>
+          <a:p>
+            <a:r>
+              <a:rPr lang="en-US" dirty="0">
+                <a:latin typeface="Arial" panose="020B0604020202020204" pitchFamily="34" charset="0"/>
+                <a:cs typeface="Arial" panose="020B0604020202020204" pitchFamily="34" charset="0"/>
+              </a:rPr>
+              <a:t>PCA Ordination</a:t>
+            </a:r>
+          </a:p>
+          <a:p>
+            <a:r>
+              <a:rPr lang="en-US" dirty="0">
+                <a:latin typeface="Arial" panose="020B0604020202020204" pitchFamily="34" charset="0"/>
+                <a:cs typeface="Arial" panose="020B0604020202020204" pitchFamily="34" charset="0"/>
+              </a:rPr>
+              <a:t>Graphing everything into one big PDF ball</a:t>
+            </a:r>
+          </a:p>
+          <a:p>
+            <a:r>
+              <a:rPr lang="en-US" dirty="0">
+                <a:latin typeface="Arial" panose="020B0604020202020204" pitchFamily="34" charset="0"/>
+                <a:cs typeface="Arial" panose="020B0604020202020204" pitchFamily="34" charset="0"/>
+              </a:rPr>
+              <a:t>Some Simple Statistical Models</a:t>
+            </a:r>
+          </a:p>
+          <a:p>
+            <a:r>
+              <a:rPr lang="en-US" dirty="0">
+                <a:latin typeface="Arial" panose="020B0604020202020204" pitchFamily="34" charset="0"/>
+                <a:cs typeface="Arial" panose="020B0604020202020204" pitchFamily="34" charset="0"/>
+              </a:rPr>
+              <a:t>Some Not So Simple Statistical Models</a:t>
+            </a:r>
+          </a:p>
+        </p:txBody>
+      </p:sp>
+      <p:cxnSp>
+        <p:nvCxnSpPr>
+          <p:cNvPr id="5" name="Straight Arrow Connector 4"/>
+          <p:cNvCxnSpPr/>
+          <p:nvPr/>
+        </p:nvCxnSpPr>
+        <p:spPr>
+          <a:xfrm flipH="1">
+            <a:off x="5231757" y="1383168"/>
+            <a:ext cx="1209555" cy="0"/>
+          </a:xfrm>
+          <a:prstGeom prst="straightConnector1">
+            <a:avLst/>
+          </a:prstGeom>
+          <a:ln>
+            <a:tailEnd type="triangle"/>
+          </a:ln>
+        </p:spPr>
+        <p:style>
+          <a:lnRef idx="1">
+            <a:schemeClr val="accent1"/>
+          </a:lnRef>
+          <a:fillRef idx="0">
+            <a:schemeClr val="accent1"/>
+          </a:fillRef>
+          <a:effectRef idx="0">
+            <a:schemeClr val="accent1"/>
+          </a:effectRef>
+          <a:fontRef idx="minor">
+            <a:schemeClr val="tx1"/>
+          </a:fontRef>
+        </p:style>
+      </p:cxnSp>
+    </p:spTree>
+    <p:extLst>
+      <p:ext uri="{BB962C8B-B14F-4D97-AF65-F5344CB8AC3E}">
+        <p14:creationId xmlns:p14="http://schemas.microsoft.com/office/powerpoint/2010/main" val="2088397650"/>
+      </p:ext>
+    </p:extLst>
+  </p:cSld>
+  <p:clrMapOvr>
+    <a:masterClrMapping/>
+  </p:clrMapOvr>
+  <p:timing>
+    <p:tnLst>
+      <p:par>
+        <p:cTn id="1" dur="indefinite" restart="never" nodeType="tmRoot"/>
+      </p:par>
+    </p:tnLst>
+  </p:timing>
 </p:sld>
 </file>
 
@@ -9941,6 +10753,13 @@
   <p:clrMapOvr>
     <a:masterClrMapping/>
   </p:clrMapOvr>
+  <p:timing>
+    <p:tnLst>
+      <p:par>
+        <p:cTn id="1" dur="indefinite" restart="never" nodeType="tmRoot"/>
+      </p:par>
+    </p:tnLst>
+  </p:timing>
 </p:sld>
 </file>
 
@@ -10055,6 +10874,13 @@
   <p:clrMapOvr>
     <a:masterClrMapping/>
   </p:clrMapOvr>
+  <p:timing>
+    <p:tnLst>
+      <p:par>
+        <p:cTn id="1" dur="indefinite" restart="never" nodeType="tmRoot"/>
+      </p:par>
+    </p:tnLst>
+  </p:timing>
 </p:sld>
 </file>
 
@@ -10216,6 +11042,13 @@
   <p:clrMapOvr>
     <a:masterClrMapping/>
   </p:clrMapOvr>
+  <p:timing>
+    <p:tnLst>
+      <p:par>
+        <p:cTn id="1" dur="indefinite" restart="never" nodeType="tmRoot"/>
+      </p:par>
+    </p:tnLst>
+  </p:timing>
 </p:sld>
 </file>
 
@@ -10308,6 +11141,13 @@
   <p:clrMapOvr>
     <a:masterClrMapping/>
   </p:clrMapOvr>
+  <p:timing>
+    <p:tnLst>
+      <p:par>
+        <p:cTn id="1" dur="indefinite" restart="never" nodeType="tmRoot"/>
+      </p:par>
+    </p:tnLst>
+  </p:timing>
 </p:sld>
 </file>
 

</xml_diff>